<commit_message>
Enable copy of font styles for table cells
</commit_message>
<xml_diff>
--- a/report-generator/src/report_generator/presets/templates/refactoring-candidates.pptx
+++ b/report-generator/src/report_generator/presets/templates/refactoring-candidates.pptx
@@ -234,7 +234,7 @@
           <a:p>
             <a:fld id="{C1255C68-584F-174D-BB81-51BF91708794}" type="datetimeFigureOut">
               <a:rPr lang="en-US" smtClean="0"/>
-              <a:t>7/8/25</a:t>
+              <a:t>7/16/25</a:t>
             </a:fld>
             <a:endParaRPr lang="en-US"/>
           </a:p>
@@ -411,7 +411,7 @@
           <a:p>
             <a:fld id="{A1EDAAC4-819D-C544-9EA1-C73624CFD70B}" type="datetimeFigureOut">
               <a:rPr lang="en-US" smtClean="0"/>
-              <a:t>7/8/25</a:t>
+              <a:t>7/16/25</a:t>
             </a:fld>
             <a:endParaRPr lang="en-US"/>
           </a:p>
@@ -21047,7 +21047,7 @@
           <p:nvPr>
             <p:extLst>
               <p:ext uri="{D42A27DB-BD31-4B8C-83A1-F6EECF244321}">
-                <p14:modId xmlns:p14="http://schemas.microsoft.com/office/powerpoint/2010/main" val="951511135"/>
+                <p14:modId xmlns:p14="http://schemas.microsoft.com/office/powerpoint/2010/main" val="3365033968"/>
               </p:ext>
             </p:extLst>
           </p:nvPr>
@@ -21100,7 +21100,7 @@
                   </a:extLst>
                 </a:gridCol>
               </a:tblGrid>
-              <a:tr h="0">
+              <a:tr h="250945">
                 <a:tc>
                   <a:txBody>
                     <a:bodyPr/>
@@ -21349,7 +21349,7 @@
                     <a:bodyPr/>
                     <a:lstStyle/>
                     <a:p>
-                      <a:pPr algn="r"/>
+                      <a:pPr algn="l"/>
                       <a:r>
                         <a:rPr lang="nl-NL" sz="1400" b="1" i="0" noProof="0" dirty="0">
                           <a:solidFill>
@@ -21400,7 +21400,7 @@
                   </a:ext>
                 </a:extLst>
               </a:tr>
-              <a:tr h="0">
+              <a:tr h="357962">
                 <a:tc>
                   <a:txBody>
                     <a:bodyPr/>
@@ -21679,9 +21679,9 @@
                     <a:bodyPr/>
                     <a:lstStyle/>
                     <a:p>
-                      <a:pPr marL="0" algn="r" defTabSz="914400" rtl="0" eaLnBrk="1" fontAlgn="b" latinLnBrk="0" hangingPunct="1"/>
+                      <a:pPr marL="0" algn="l" defTabSz="914400" rtl="0" eaLnBrk="1" fontAlgn="b" latinLnBrk="0" hangingPunct="1"/>
                       <a:r>
-                        <a:rPr lang="en-US" sz="1200" b="0" i="0" u="none" strike="noStrike" kern="1200">
+                        <a:rPr lang="en-US" sz="1200" b="0" i="0" u="none" strike="noStrike" kern="1200" dirty="0">
                           <a:solidFill>
                             <a:schemeClr val="tx1">
                               <a:lumMod val="60000"/>
@@ -21695,18 +21695,6 @@
                         </a:rPr>
                         <a:t>Example Style</a:t>
                       </a:r>
-                      <a:endParaRPr lang="en-US" sz="1200" b="0" i="0" u="none" strike="noStrike" kern="1200" dirty="0">
-                        <a:solidFill>
-                          <a:schemeClr val="tx1">
-                            <a:lumMod val="60000"/>
-                            <a:lumOff val="40000"/>
-                          </a:schemeClr>
-                        </a:solidFill>
-                        <a:effectLst/>
-                        <a:latin typeface="Calibri Regular"/>
-                        <a:ea typeface="+mn-ea"/>
-                        <a:cs typeface="+mn-cs"/>
-                      </a:endParaRPr>
                     </a:p>
                   </a:txBody>
                   <a:tcPr marL="108000" marR="108000" marT="72000" marB="72000" anchor="ctr">
@@ -21755,7 +21743,7 @@
                   </a:ext>
                 </a:extLst>
               </a:tr>
-              <a:tr h="0">
+              <a:tr h="229541">
                 <a:tc>
                   <a:txBody>
                     <a:bodyPr/>
@@ -22042,7 +22030,7 @@
                     <a:bodyPr/>
                     <a:lstStyle/>
                     <a:p>
-                      <a:pPr marL="0" algn="r" defTabSz="914400" rtl="0" eaLnBrk="1" fontAlgn="b" latinLnBrk="0" hangingPunct="1"/>
+                      <a:pPr marL="0" algn="l" defTabSz="914400" rtl="0" eaLnBrk="1" fontAlgn="b" latinLnBrk="0" hangingPunct="1"/>
                       <a:endParaRPr lang="en-US" sz="1200" b="0" i="0" u="none" strike="noStrike" kern="1200" dirty="0">
                         <a:solidFill>
                           <a:schemeClr val="tx1">
@@ -22108,7 +22096,7 @@
                   </a:ext>
                 </a:extLst>
               </a:tr>
-              <a:tr h="0">
+              <a:tr h="229541">
                 <a:tc>
                   <a:txBody>
                     <a:bodyPr/>
@@ -22379,6 +22367,296 @@
                     <a:bodyPr/>
                     <a:lstStyle/>
                     <a:p>
+                      <a:pPr marL="0" algn="l" defTabSz="914400" rtl="0" eaLnBrk="1" fontAlgn="b" latinLnBrk="0" hangingPunct="1"/>
+                      <a:endParaRPr lang="en-US" sz="1200" b="0" i="0" u="none" strike="noStrike" kern="1200" dirty="0">
+                        <a:solidFill>
+                          <a:schemeClr val="tx1">
+                            <a:lumMod val="60000"/>
+                            <a:lumOff val="40000"/>
+                          </a:schemeClr>
+                        </a:solidFill>
+                        <a:effectLst/>
+                        <a:latin typeface="Calibri Regular"/>
+                        <a:ea typeface="+mn-ea"/>
+                        <a:cs typeface="+mn-cs"/>
+                      </a:endParaRPr>
+                    </a:p>
+                  </a:txBody>
+                  <a:tcPr marL="108000" marR="108000" marT="72000" marB="72000" anchor="ctr">
+                    <a:lnL>
+                      <a:noFill/>
+                    </a:lnL>
+                    <a:lnR w="9525" cap="flat" cmpd="sng" algn="ctr">
+                      <a:noFill/>
+                      <a:prstDash val="solid"/>
+                    </a:lnR>
+                    <a:lnT w="12700" cap="flat" cmpd="sng" algn="ctr">
+                      <a:solidFill>
+                        <a:schemeClr val="tx1">
+                          <a:lumMod val="40000"/>
+                          <a:lumOff val="60000"/>
+                        </a:schemeClr>
+                      </a:solidFill>
+                      <a:prstDash val="sysDot"/>
+                      <a:round/>
+                      <a:headEnd type="none" w="med" len="med"/>
+                      <a:tailEnd type="none" w="med" len="med"/>
+                    </a:lnT>
+                    <a:lnB w="12700" cap="flat" cmpd="sng" algn="ctr">
+                      <a:solidFill>
+                        <a:schemeClr val="tx1">
+                          <a:lumMod val="40000"/>
+                          <a:lumOff val="60000"/>
+                        </a:schemeClr>
+                      </a:solidFill>
+                      <a:prstDash val="sysDot"/>
+                      <a:round/>
+                      <a:headEnd type="none" w="med" len="med"/>
+                      <a:tailEnd type="none" w="med" len="med"/>
+                    </a:lnB>
+                    <a:lnTlToBr w="12700" cmpd="sng">
+                      <a:noFill/>
+                      <a:prstDash val="solid"/>
+                    </a:lnTlToBr>
+                    <a:lnBlToTr w="12700" cmpd="sng">
+                      <a:noFill/>
+                      <a:prstDash val="solid"/>
+                    </a:lnBlToTr>
+                    <a:solidFill>
+                      <a:schemeClr val="bg1"/>
+                    </a:solidFill>
+                  </a:tcPr>
+                </a:tc>
+                <a:extLst>
+                  <a:ext uri="{0D108BD9-81ED-4DB2-BD59-A6C34878D82A}">
+                    <a16:rowId xmlns:a16="http://schemas.microsoft.com/office/drawing/2014/main" val="10003"/>
+                  </a:ext>
+                </a:extLst>
+              </a:tr>
+              <a:tr h="229541">
+                <a:tc>
+                  <a:txBody>
+                    <a:bodyPr/>
+                    <a:lstStyle/>
+                    <a:p>
+                      <a:pPr algn="l" fontAlgn="b"/>
+                      <a:endParaRPr lang="en-US" sz="1200" b="0" i="0" u="none" strike="noStrike" dirty="0">
+                        <a:solidFill>
+                          <a:schemeClr val="tx2"/>
+                        </a:solidFill>
+                        <a:effectLst/>
+                        <a:latin typeface="Calibri Regular"/>
+                      </a:endParaRPr>
+                    </a:p>
+                  </a:txBody>
+                  <a:tcPr marL="108000" marR="108000" marT="72000" marB="72000" anchor="ctr">
+                    <a:lnL w="9525" cap="flat" cmpd="sng" algn="ctr">
+                      <a:noFill/>
+                      <a:prstDash val="solid"/>
+                    </a:lnL>
+                    <a:lnR>
+                      <a:noFill/>
+                    </a:lnR>
+                    <a:lnT w="12700" cap="flat" cmpd="sng" algn="ctr">
+                      <a:solidFill>
+                        <a:schemeClr val="tx1">
+                          <a:lumMod val="40000"/>
+                          <a:lumOff val="60000"/>
+                        </a:schemeClr>
+                      </a:solidFill>
+                      <a:prstDash val="sysDot"/>
+                      <a:round/>
+                      <a:headEnd type="none" w="med" len="med"/>
+                      <a:tailEnd type="none" w="med" len="med"/>
+                    </a:lnT>
+                    <a:lnB w="12700" cap="flat" cmpd="sng" algn="ctr">
+                      <a:solidFill>
+                        <a:schemeClr val="tx1">
+                          <a:lumMod val="40000"/>
+                          <a:lumOff val="60000"/>
+                        </a:schemeClr>
+                      </a:solidFill>
+                      <a:prstDash val="sysDot"/>
+                      <a:round/>
+                      <a:headEnd type="none" w="med" len="med"/>
+                      <a:tailEnd type="none" w="med" len="med"/>
+                    </a:lnB>
+                    <a:lnTlToBr w="12700" cmpd="sng">
+                      <a:noFill/>
+                      <a:prstDash val="solid"/>
+                    </a:lnTlToBr>
+                    <a:lnBlToTr w="12700" cmpd="sng">
+                      <a:noFill/>
+                      <a:prstDash val="solid"/>
+                    </a:lnBlToTr>
+                    <a:solidFill>
+                      <a:schemeClr val="bg1"/>
+                    </a:solidFill>
+                  </a:tcPr>
+                </a:tc>
+                <a:tc>
+                  <a:txBody>
+                    <a:bodyPr/>
+                    <a:lstStyle/>
+                    <a:p>
+                      <a:pPr marL="0" marR="0" lvl="0" indent="0" algn="r" defTabSz="914400" rtl="0" eaLnBrk="1" fontAlgn="b" latinLnBrk="0" hangingPunct="1">
+                        <a:lnSpc>
+                          <a:spcPct val="100000"/>
+                        </a:lnSpc>
+                        <a:spcBef>
+                          <a:spcPts val="0"/>
+                        </a:spcBef>
+                        <a:spcAft>
+                          <a:spcPts val="0"/>
+                        </a:spcAft>
+                        <a:buClrTx/>
+                        <a:buSzTx/>
+                        <a:buFontTx/>
+                        <a:buNone/>
+                        <a:tabLst/>
+                        <a:defRPr/>
+                      </a:pPr>
+                      <a:r>
+                        <a:rPr lang="en-US" sz="1200" b="0" i="0" u="none" strike="noStrike" kern="1200" dirty="0">
+                          <a:solidFill>
+                            <a:schemeClr val="tx2"/>
+                          </a:solidFill>
+                          <a:effectLst/>
+                          <a:latin typeface="Calibri Bold"/>
+                          <a:ea typeface="+mn-ea"/>
+                          <a:cs typeface="+mn-cs"/>
+                        </a:rPr>
+                        <a:t>Style change</a:t>
+                      </a:r>
+                    </a:p>
+                  </a:txBody>
+                  <a:tcPr marL="108000" marR="108000" marT="72000" marB="72000" anchor="ctr">
+                    <a:lnL>
+                      <a:noFill/>
+                    </a:lnL>
+                    <a:lnR>
+                      <a:noFill/>
+                    </a:lnR>
+                    <a:lnT w="12700" cap="flat" cmpd="sng" algn="ctr">
+                      <a:solidFill>
+                        <a:schemeClr val="tx1">
+                          <a:lumMod val="40000"/>
+                          <a:lumOff val="60000"/>
+                        </a:schemeClr>
+                      </a:solidFill>
+                      <a:prstDash val="sysDot"/>
+                      <a:round/>
+                      <a:headEnd type="none" w="med" len="med"/>
+                      <a:tailEnd type="none" w="med" len="med"/>
+                    </a:lnT>
+                    <a:lnB w="12700" cap="flat" cmpd="sng" algn="ctr">
+                      <a:solidFill>
+                        <a:schemeClr val="tx1">
+                          <a:lumMod val="40000"/>
+                          <a:lumOff val="60000"/>
+                        </a:schemeClr>
+                      </a:solidFill>
+                      <a:prstDash val="sysDot"/>
+                      <a:round/>
+                      <a:headEnd type="none" w="med" len="med"/>
+                      <a:tailEnd type="none" w="med" len="med"/>
+                    </a:lnB>
+                    <a:lnTlToBr w="12700" cmpd="sng">
+                      <a:noFill/>
+                      <a:prstDash val="solid"/>
+                    </a:lnTlToBr>
+                    <a:lnBlToTr w="12700" cmpd="sng">
+                      <a:noFill/>
+                      <a:prstDash val="solid"/>
+                    </a:lnBlToTr>
+                    <a:solidFill>
+                      <a:srgbClr val="FEF5BA"/>
+                    </a:solidFill>
+                  </a:tcPr>
+                </a:tc>
+                <a:tc>
+                  <a:txBody>
+                    <a:bodyPr/>
+                    <a:lstStyle/>
+                    <a:p>
+                      <a:pPr marL="0" marR="0" lvl="0" indent="0" algn="r" defTabSz="914400" rtl="0" eaLnBrk="1" fontAlgn="b" latinLnBrk="0" hangingPunct="1">
+                        <a:lnSpc>
+                          <a:spcPct val="100000"/>
+                        </a:lnSpc>
+                        <a:spcBef>
+                          <a:spcPts val="0"/>
+                        </a:spcBef>
+                        <a:spcAft>
+                          <a:spcPts val="0"/>
+                        </a:spcAft>
+                        <a:buClrTx/>
+                        <a:buSzTx/>
+                        <a:buFontTx/>
+                        <a:buNone/>
+                        <a:tabLst/>
+                        <a:defRPr/>
+                      </a:pPr>
+                      <a:endParaRPr lang="en-US" sz="1200" b="0" i="0" u="none" strike="noStrike" kern="1200" dirty="0">
+                        <a:solidFill>
+                          <a:schemeClr val="tx2"/>
+                        </a:solidFill>
+                        <a:effectLst/>
+                        <a:latin typeface="Calibri Bold"/>
+                        <a:ea typeface="+mn-ea"/>
+                        <a:cs typeface="+mn-cs"/>
+                      </a:endParaRPr>
+                    </a:p>
+                  </a:txBody>
+                  <a:tcPr marL="108000" marR="108000" marT="72000" marB="72000" anchor="ctr">
+                    <a:lnL>
+                      <a:noFill/>
+                    </a:lnL>
+                    <a:lnR w="9525" cap="flat" cmpd="sng" algn="ctr">
+                      <a:noFill/>
+                      <a:prstDash val="solid"/>
+                    </a:lnR>
+                    <a:lnT w="12700" cap="flat" cmpd="sng" algn="ctr">
+                      <a:solidFill>
+                        <a:schemeClr val="tx1">
+                          <a:lumMod val="40000"/>
+                          <a:lumOff val="60000"/>
+                        </a:schemeClr>
+                      </a:solidFill>
+                      <a:prstDash val="sysDot"/>
+                      <a:round/>
+                      <a:headEnd type="none" w="med" len="med"/>
+                      <a:tailEnd type="none" w="med" len="med"/>
+                    </a:lnT>
+                    <a:lnB w="12700" cap="flat" cmpd="sng" algn="ctr">
+                      <a:solidFill>
+                        <a:schemeClr val="tx1">
+                          <a:lumMod val="40000"/>
+                          <a:lumOff val="60000"/>
+                        </a:schemeClr>
+                      </a:solidFill>
+                      <a:prstDash val="sysDot"/>
+                      <a:round/>
+                      <a:headEnd type="none" w="med" len="med"/>
+                      <a:tailEnd type="none" w="med" len="med"/>
+                    </a:lnB>
+                    <a:lnTlToBr w="12700" cmpd="sng">
+                      <a:noFill/>
+                      <a:prstDash val="solid"/>
+                    </a:lnTlToBr>
+                    <a:lnBlToTr w="12700" cmpd="sng">
+                      <a:noFill/>
+                      <a:prstDash val="solid"/>
+                    </a:lnBlToTr>
+                    <a:solidFill>
+                      <a:schemeClr val="bg1"/>
+                    </a:solidFill>
+                  </a:tcPr>
+                </a:tc>
+                <a:tc>
+                  <a:txBody>
+                    <a:bodyPr/>
+                    <a:lstStyle/>
+                    <a:p>
                       <a:pPr marL="0" algn="r" defTabSz="914400" rtl="0" eaLnBrk="1" fontAlgn="b" latinLnBrk="0" hangingPunct="1"/>
                       <a:endParaRPr lang="en-US" sz="1200" b="0" i="0" u="none" strike="noStrike" kern="1200" dirty="0">
                         <a:solidFill>
@@ -22439,13 +22717,78 @@
                     </a:solidFill>
                   </a:tcPr>
                 </a:tc>
+                <a:tc>
+                  <a:txBody>
+                    <a:bodyPr/>
+                    <a:lstStyle/>
+                    <a:p>
+                      <a:pPr marL="0" algn="l" defTabSz="914400" rtl="0" eaLnBrk="1" fontAlgn="b" latinLnBrk="0" hangingPunct="1"/>
+                      <a:endParaRPr lang="en-US" sz="1200" b="0" i="0" u="none" strike="noStrike" kern="1200" dirty="0">
+                        <a:solidFill>
+                          <a:schemeClr val="tx1">
+                            <a:lumMod val="60000"/>
+                            <a:lumOff val="40000"/>
+                          </a:schemeClr>
+                        </a:solidFill>
+                        <a:effectLst/>
+                        <a:latin typeface="Calibri Regular"/>
+                        <a:ea typeface="+mn-ea"/>
+                        <a:cs typeface="+mn-cs"/>
+                      </a:endParaRPr>
+                    </a:p>
+                  </a:txBody>
+                  <a:tcPr marL="108000" marR="108000" marT="72000" marB="72000" anchor="ctr">
+                    <a:lnL>
+                      <a:noFill/>
+                    </a:lnL>
+                    <a:lnR w="9525" cap="flat" cmpd="sng" algn="ctr">
+                      <a:noFill/>
+                      <a:prstDash val="solid"/>
+                    </a:lnR>
+                    <a:lnT w="12700" cap="flat" cmpd="sng" algn="ctr">
+                      <a:solidFill>
+                        <a:schemeClr val="tx1">
+                          <a:lumMod val="40000"/>
+                          <a:lumOff val="60000"/>
+                        </a:schemeClr>
+                      </a:solidFill>
+                      <a:prstDash val="sysDot"/>
+                      <a:round/>
+                      <a:headEnd type="none" w="med" len="med"/>
+                      <a:tailEnd type="none" w="med" len="med"/>
+                    </a:lnT>
+                    <a:lnB w="12700" cap="flat" cmpd="sng" algn="ctr">
+                      <a:solidFill>
+                        <a:schemeClr val="tx1">
+                          <a:lumMod val="40000"/>
+                          <a:lumOff val="60000"/>
+                        </a:schemeClr>
+                      </a:solidFill>
+                      <a:prstDash val="sysDot"/>
+                      <a:round/>
+                      <a:headEnd type="none" w="med" len="med"/>
+                      <a:tailEnd type="none" w="med" len="med"/>
+                    </a:lnB>
+                    <a:lnTlToBr w="12700" cmpd="sng">
+                      <a:noFill/>
+                      <a:prstDash val="solid"/>
+                    </a:lnTlToBr>
+                    <a:lnBlToTr w="12700" cmpd="sng">
+                      <a:noFill/>
+                      <a:prstDash val="solid"/>
+                    </a:lnBlToTr>
+                    <a:solidFill>
+                      <a:schemeClr val="bg1"/>
+                    </a:solidFill>
+                  </a:tcPr>
+                </a:tc>
                 <a:extLst>
                   <a:ext uri="{0D108BD9-81ED-4DB2-BD59-A6C34878D82A}">
-                    <a16:rowId xmlns:a16="http://schemas.microsoft.com/office/drawing/2014/main" val="10003"/>
+                    <a16:rowId xmlns:a16="http://schemas.microsoft.com/office/drawing/2014/main" val="10004"/>
                   </a:ext>
                 </a:extLst>
               </a:tr>
-              <a:tr h="0">
+              <a:tr h="229541">
                 <a:tc>
                   <a:txBody>
                     <a:bodyPr/>
@@ -22716,7 +23059,7 @@
                     <a:bodyPr/>
                     <a:lstStyle/>
                     <a:p>
-                      <a:pPr marL="0" algn="r" defTabSz="914400" rtl="0" eaLnBrk="1" fontAlgn="b" latinLnBrk="0" hangingPunct="1"/>
+                      <a:pPr marL="0" algn="l" defTabSz="914400" rtl="0" eaLnBrk="1" fontAlgn="b" latinLnBrk="0" hangingPunct="1"/>
                       <a:endParaRPr lang="en-US" sz="1200" b="0" i="0" u="none" strike="noStrike" kern="1200" dirty="0">
                         <a:solidFill>
                           <a:schemeClr val="tx1">
@@ -22778,11 +23121,11 @@
                 </a:tc>
                 <a:extLst>
                   <a:ext uri="{0D108BD9-81ED-4DB2-BD59-A6C34878D82A}">
-                    <a16:rowId xmlns:a16="http://schemas.microsoft.com/office/drawing/2014/main" val="10004"/>
+                    <a16:rowId xmlns:a16="http://schemas.microsoft.com/office/drawing/2014/main" val="2001900654"/>
                   </a:ext>
                 </a:extLst>
               </a:tr>
-              <a:tr h="0">
+              <a:tr h="229541">
                 <a:tc>
                   <a:txBody>
                     <a:bodyPr/>
@@ -23053,7 +23396,7 @@
                     <a:bodyPr/>
                     <a:lstStyle/>
                     <a:p>
-                      <a:pPr marL="0" algn="r" defTabSz="914400" rtl="0" eaLnBrk="1" fontAlgn="b" latinLnBrk="0" hangingPunct="1"/>
+                      <a:pPr marL="0" algn="l" defTabSz="914400" rtl="0" eaLnBrk="1" fontAlgn="b" latinLnBrk="0" hangingPunct="1"/>
                       <a:endParaRPr lang="en-US" sz="1200" b="0" i="0" u="none" strike="noStrike" kern="1200" dirty="0">
                         <a:solidFill>
                           <a:schemeClr val="tx1">
@@ -23115,11 +23458,11 @@
                 </a:tc>
                 <a:extLst>
                   <a:ext uri="{0D108BD9-81ED-4DB2-BD59-A6C34878D82A}">
-                    <a16:rowId xmlns:a16="http://schemas.microsoft.com/office/drawing/2014/main" val="2001900654"/>
+                    <a16:rowId xmlns:a16="http://schemas.microsoft.com/office/drawing/2014/main" val="928811833"/>
                   </a:ext>
                 </a:extLst>
               </a:tr>
-              <a:tr h="0">
+              <a:tr h="229541">
                 <a:tc>
                   <a:txBody>
                     <a:bodyPr/>
@@ -23390,7 +23733,7 @@
                     <a:bodyPr/>
                     <a:lstStyle/>
                     <a:p>
-                      <a:pPr marL="0" algn="r" defTabSz="914400" rtl="0" eaLnBrk="1" fontAlgn="b" latinLnBrk="0" hangingPunct="1"/>
+                      <a:pPr marL="0" algn="l" defTabSz="914400" rtl="0" eaLnBrk="1" fontAlgn="b" latinLnBrk="0" hangingPunct="1"/>
                       <a:endParaRPr lang="en-US" sz="1200" b="0" i="0" u="none" strike="noStrike" kern="1200" dirty="0">
                         <a:solidFill>
                           <a:schemeClr val="tx1">
@@ -23452,11 +23795,11 @@
                 </a:tc>
                 <a:extLst>
                   <a:ext uri="{0D108BD9-81ED-4DB2-BD59-A6C34878D82A}">
-                    <a16:rowId xmlns:a16="http://schemas.microsoft.com/office/drawing/2014/main" val="928811833"/>
+                    <a16:rowId xmlns:a16="http://schemas.microsoft.com/office/drawing/2014/main" val="4060795780"/>
                   </a:ext>
                 </a:extLst>
               </a:tr>
-              <a:tr h="0">
+              <a:tr h="229541">
                 <a:tc>
                   <a:txBody>
                     <a:bodyPr/>
@@ -23727,7 +24070,7 @@
                     <a:bodyPr/>
                     <a:lstStyle/>
                     <a:p>
-                      <a:pPr marL="0" algn="r" defTabSz="914400" rtl="0" eaLnBrk="1" fontAlgn="b" latinLnBrk="0" hangingPunct="1"/>
+                      <a:pPr marL="0" algn="l" defTabSz="914400" rtl="0" eaLnBrk="1" fontAlgn="b" latinLnBrk="0" hangingPunct="1"/>
                       <a:endParaRPr lang="en-US" sz="1200" b="0" i="0" u="none" strike="noStrike" kern="1200" dirty="0">
                         <a:solidFill>
                           <a:schemeClr val="tx1">
@@ -23789,11 +24132,11 @@
                 </a:tc>
                 <a:extLst>
                   <a:ext uri="{0D108BD9-81ED-4DB2-BD59-A6C34878D82A}">
-                    <a16:rowId xmlns:a16="http://schemas.microsoft.com/office/drawing/2014/main" val="4060795780"/>
+                    <a16:rowId xmlns:a16="http://schemas.microsoft.com/office/drawing/2014/main" val="933267410"/>
                   </a:ext>
                 </a:extLst>
               </a:tr>
-              <a:tr h="0">
+              <a:tr h="229541">
                 <a:tc>
                   <a:txBody>
                     <a:bodyPr/>
@@ -24064,7 +24407,7 @@
                     <a:bodyPr/>
                     <a:lstStyle/>
                     <a:p>
-                      <a:pPr marL="0" algn="r" defTabSz="914400" rtl="0" eaLnBrk="1" fontAlgn="b" latinLnBrk="0" hangingPunct="1"/>
+                      <a:pPr marL="0" algn="l" defTabSz="914400" rtl="0" eaLnBrk="1" fontAlgn="b" latinLnBrk="0" hangingPunct="1"/>
                       <a:endParaRPr lang="en-US" sz="1200" b="0" i="0" u="none" strike="noStrike" kern="1200" dirty="0">
                         <a:solidFill>
                           <a:schemeClr val="tx1">
@@ -24126,11 +24469,11 @@
                 </a:tc>
                 <a:extLst>
                   <a:ext uri="{0D108BD9-81ED-4DB2-BD59-A6C34878D82A}">
-                    <a16:rowId xmlns:a16="http://schemas.microsoft.com/office/drawing/2014/main" val="933267410"/>
+                    <a16:rowId xmlns:a16="http://schemas.microsoft.com/office/drawing/2014/main" val="2009910387"/>
                   </a:ext>
                 </a:extLst>
               </a:tr>
-              <a:tr h="0">
+              <a:tr h="229541">
                 <a:tc>
                   <a:txBody>
                     <a:bodyPr/>
@@ -24401,7 +24744,7 @@
                     <a:bodyPr/>
                     <a:lstStyle/>
                     <a:p>
-                      <a:pPr marL="0" algn="r" defTabSz="914400" rtl="0" eaLnBrk="1" fontAlgn="b" latinLnBrk="0" hangingPunct="1"/>
+                      <a:pPr marL="0" algn="l" defTabSz="914400" rtl="0" eaLnBrk="1" fontAlgn="b" latinLnBrk="0" hangingPunct="1"/>
                       <a:endParaRPr lang="en-US" sz="1200" b="0" i="0" u="none" strike="noStrike" kern="1200" dirty="0">
                         <a:solidFill>
                           <a:schemeClr val="tx1">
@@ -24463,11 +24806,11 @@
                 </a:tc>
                 <a:extLst>
                   <a:ext uri="{0D108BD9-81ED-4DB2-BD59-A6C34878D82A}">
-                    <a16:rowId xmlns:a16="http://schemas.microsoft.com/office/drawing/2014/main" val="2009910387"/>
+                    <a16:rowId xmlns:a16="http://schemas.microsoft.com/office/drawing/2014/main" val="1372763307"/>
                   </a:ext>
                 </a:extLst>
               </a:tr>
-              <a:tr h="0">
+              <a:tr h="229541">
                 <a:tc>
                   <a:txBody>
                     <a:bodyPr/>
@@ -24738,7 +25081,7 @@
                     <a:bodyPr/>
                     <a:lstStyle/>
                     <a:p>
-                      <a:pPr marL="0" algn="r" defTabSz="914400" rtl="0" eaLnBrk="1" fontAlgn="b" latinLnBrk="0" hangingPunct="1"/>
+                      <a:pPr marL="0" algn="l" defTabSz="914400" rtl="0" eaLnBrk="1" fontAlgn="b" latinLnBrk="0" hangingPunct="1"/>
                       <a:endParaRPr lang="en-US" sz="1200" b="0" i="0" u="none" strike="noStrike" kern="1200" dirty="0">
                         <a:solidFill>
                           <a:schemeClr val="tx1">
@@ -24800,11 +25143,11 @@
                 </a:tc>
                 <a:extLst>
                   <a:ext uri="{0D108BD9-81ED-4DB2-BD59-A6C34878D82A}">
-                    <a16:rowId xmlns:a16="http://schemas.microsoft.com/office/drawing/2014/main" val="1372763307"/>
+                    <a16:rowId xmlns:a16="http://schemas.microsoft.com/office/drawing/2014/main" val="4022263985"/>
                   </a:ext>
                 </a:extLst>
               </a:tr>
-              <a:tr h="0">
+              <a:tr h="229541">
                 <a:tc>
                   <a:txBody>
                     <a:bodyPr/>
@@ -25075,7 +25418,7 @@
                     <a:bodyPr/>
                     <a:lstStyle/>
                     <a:p>
-                      <a:pPr marL="0" algn="r" defTabSz="914400" rtl="0" eaLnBrk="1" fontAlgn="b" latinLnBrk="0" hangingPunct="1"/>
+                      <a:pPr marL="0" algn="l" defTabSz="914400" rtl="0" eaLnBrk="1" fontAlgn="b" latinLnBrk="0" hangingPunct="1"/>
                       <a:endParaRPr lang="en-US" sz="1200" b="0" i="0" u="none" strike="noStrike" kern="1200" dirty="0">
                         <a:solidFill>
                           <a:schemeClr val="tx1">
@@ -25137,17 +25480,33 @@
                 </a:tc>
                 <a:extLst>
                   <a:ext uri="{0D108BD9-81ED-4DB2-BD59-A6C34878D82A}">
-                    <a16:rowId xmlns:a16="http://schemas.microsoft.com/office/drawing/2014/main" val="4022263985"/>
+                    <a16:rowId xmlns:a16="http://schemas.microsoft.com/office/drawing/2014/main" val="516404128"/>
                   </a:ext>
                 </a:extLst>
               </a:tr>
-              <a:tr h="0">
+              <a:tr h="229541">
                 <a:tc>
                   <a:txBody>
                     <a:bodyPr/>
                     <a:lstStyle/>
                     <a:p>
-                      <a:pPr algn="l" fontAlgn="b"/>
+                      <a:pPr marL="0" marR="0" lvl="0" indent="0" algn="l" defTabSz="914400" rtl="0" eaLnBrk="1" fontAlgn="b" latinLnBrk="0" hangingPunct="1">
+                        <a:lnSpc>
+                          <a:spcPct val="100000"/>
+                        </a:lnSpc>
+                        <a:spcBef>
+                          <a:spcPts val="0"/>
+                        </a:spcBef>
+                        <a:spcAft>
+                          <a:spcPts val="0"/>
+                        </a:spcAft>
+                        <a:buClrTx/>
+                        <a:buSzTx/>
+                        <a:buFontTx/>
+                        <a:buNone/>
+                        <a:tabLst/>
+                        <a:defRPr/>
+                      </a:pPr>
                       <a:endParaRPr lang="en-US" sz="1200" b="0" i="0" u="none" strike="noStrike" dirty="0">
                         <a:solidFill>
                           <a:schemeClr val="tx2"/>
@@ -25412,7 +25771,7 @@
                     <a:bodyPr/>
                     <a:lstStyle/>
                     <a:p>
-                      <a:pPr marL="0" algn="r" defTabSz="914400" rtl="0" eaLnBrk="1" fontAlgn="b" latinLnBrk="0" hangingPunct="1"/>
+                      <a:pPr marL="0" algn="l" defTabSz="914400" rtl="0" eaLnBrk="1" fontAlgn="b" latinLnBrk="0" hangingPunct="1"/>
                       <a:endParaRPr lang="en-US" sz="1200" b="0" i="0" u="none" strike="noStrike" kern="1200" dirty="0">
                         <a:solidFill>
                           <a:schemeClr val="tx1">
@@ -25474,11 +25833,11 @@
                 </a:tc>
                 <a:extLst>
                   <a:ext uri="{0D108BD9-81ED-4DB2-BD59-A6C34878D82A}">
-                    <a16:rowId xmlns:a16="http://schemas.microsoft.com/office/drawing/2014/main" val="516404128"/>
+                    <a16:rowId xmlns:a16="http://schemas.microsoft.com/office/drawing/2014/main" val="3255606331"/>
                   </a:ext>
                 </a:extLst>
               </a:tr>
-              <a:tr h="0">
+              <a:tr h="229541">
                 <a:tc>
                   <a:txBody>
                     <a:bodyPr/>
@@ -25531,13 +25890,8 @@
                       <a:tailEnd type="none" w="med" len="med"/>
                     </a:lnT>
                     <a:lnB w="12700" cap="flat" cmpd="sng" algn="ctr">
-                      <a:solidFill>
-                        <a:schemeClr val="tx1">
-                          <a:lumMod val="40000"/>
-                          <a:lumOff val="60000"/>
-                        </a:schemeClr>
-                      </a:solidFill>
-                      <a:prstDash val="sysDot"/>
+                      <a:noFill/>
+                      <a:prstDash val="solid"/>
                       <a:round/>
                       <a:headEnd type="none" w="med" len="med"/>
                       <a:tailEnd type="none" w="med" len="med"/>
@@ -25608,13 +25962,8 @@
                       <a:tailEnd type="none" w="med" len="med"/>
                     </a:lnT>
                     <a:lnB w="12700" cap="flat" cmpd="sng" algn="ctr">
-                      <a:solidFill>
-                        <a:schemeClr val="tx1">
-                          <a:lumMod val="40000"/>
-                          <a:lumOff val="60000"/>
-                        </a:schemeClr>
-                      </a:solidFill>
-                      <a:prstDash val="sysDot"/>
+                      <a:noFill/>
+                      <a:prstDash val="solid"/>
                       <a:round/>
                       <a:headEnd type="none" w="med" len="med"/>
                       <a:tailEnd type="none" w="med" len="med"/>
@@ -25671,13 +26020,8 @@
                       <a:tailEnd type="none" w="med" len="med"/>
                     </a:lnT>
                     <a:lnB w="12700" cap="flat" cmpd="sng" algn="ctr">
-                      <a:solidFill>
-                        <a:schemeClr val="tx1">
-                          <a:lumMod val="40000"/>
-                          <a:lumOff val="60000"/>
-                        </a:schemeClr>
-                      </a:solidFill>
-                      <a:prstDash val="sysDot"/>
+                      <a:noFill/>
+                      <a:prstDash val="solid"/>
                       <a:round/>
                       <a:headEnd type="none" w="med" len="med"/>
                       <a:tailEnd type="none" w="med" len="med"/>
@@ -25736,13 +26080,8 @@
                       <a:tailEnd type="none" w="med" len="med"/>
                     </a:lnT>
                     <a:lnB w="12700" cap="flat" cmpd="sng" algn="ctr">
-                      <a:solidFill>
-                        <a:schemeClr val="tx1">
-                          <a:lumMod val="40000"/>
-                          <a:lumOff val="60000"/>
-                        </a:schemeClr>
-                      </a:solidFill>
-                      <a:prstDash val="sysDot"/>
+                      <a:noFill/>
+                      <a:prstDash val="solid"/>
                       <a:round/>
                       <a:headEnd type="none" w="med" len="med"/>
                       <a:tailEnd type="none" w="med" len="med"/>
@@ -25765,340 +26104,7 @@
                     <a:bodyPr/>
                     <a:lstStyle/>
                     <a:p>
-                      <a:pPr marL="0" algn="r" defTabSz="914400" rtl="0" eaLnBrk="1" fontAlgn="b" latinLnBrk="0" hangingPunct="1"/>
-                      <a:endParaRPr lang="en-US" sz="1200" b="0" i="0" u="none" strike="noStrike" kern="1200" dirty="0">
-                        <a:solidFill>
-                          <a:schemeClr val="tx1">
-                            <a:lumMod val="60000"/>
-                            <a:lumOff val="40000"/>
-                          </a:schemeClr>
-                        </a:solidFill>
-                        <a:effectLst/>
-                        <a:latin typeface="Calibri Regular"/>
-                        <a:ea typeface="+mn-ea"/>
-                        <a:cs typeface="+mn-cs"/>
-                      </a:endParaRPr>
-                    </a:p>
-                  </a:txBody>
-                  <a:tcPr marL="108000" marR="108000" marT="72000" marB="72000" anchor="ctr">
-                    <a:lnL>
-                      <a:noFill/>
-                    </a:lnL>
-                    <a:lnR w="9525" cap="flat" cmpd="sng" algn="ctr">
-                      <a:noFill/>
-                      <a:prstDash val="solid"/>
-                    </a:lnR>
-                    <a:lnT w="12700" cap="flat" cmpd="sng" algn="ctr">
-                      <a:solidFill>
-                        <a:schemeClr val="tx1">
-                          <a:lumMod val="40000"/>
-                          <a:lumOff val="60000"/>
-                        </a:schemeClr>
-                      </a:solidFill>
-                      <a:prstDash val="sysDot"/>
-                      <a:round/>
-                      <a:headEnd type="none" w="med" len="med"/>
-                      <a:tailEnd type="none" w="med" len="med"/>
-                    </a:lnT>
-                    <a:lnB w="12700" cap="flat" cmpd="sng" algn="ctr">
-                      <a:solidFill>
-                        <a:schemeClr val="tx1">
-                          <a:lumMod val="40000"/>
-                          <a:lumOff val="60000"/>
-                        </a:schemeClr>
-                      </a:solidFill>
-                      <a:prstDash val="sysDot"/>
-                      <a:round/>
-                      <a:headEnd type="none" w="med" len="med"/>
-                      <a:tailEnd type="none" w="med" len="med"/>
-                    </a:lnB>
-                    <a:lnTlToBr w="12700" cmpd="sng">
-                      <a:noFill/>
-                      <a:prstDash val="solid"/>
-                    </a:lnTlToBr>
-                    <a:lnBlToTr w="12700" cmpd="sng">
-                      <a:noFill/>
-                      <a:prstDash val="solid"/>
-                    </a:lnBlToTr>
-                    <a:solidFill>
-                      <a:schemeClr val="bg1"/>
-                    </a:solidFill>
-                  </a:tcPr>
-                </a:tc>
-                <a:extLst>
-                  <a:ext uri="{0D108BD9-81ED-4DB2-BD59-A6C34878D82A}">
-                    <a16:rowId xmlns:a16="http://schemas.microsoft.com/office/drawing/2014/main" val="3255606331"/>
-                  </a:ext>
-                </a:extLst>
-              </a:tr>
-              <a:tr h="0">
-                <a:tc>
-                  <a:txBody>
-                    <a:bodyPr/>
-                    <a:lstStyle/>
-                    <a:p>
-                      <a:pPr marL="0" marR="0" lvl="0" indent="0" algn="l" defTabSz="914400" rtl="0" eaLnBrk="1" fontAlgn="b" latinLnBrk="0" hangingPunct="1">
-                        <a:lnSpc>
-                          <a:spcPct val="100000"/>
-                        </a:lnSpc>
-                        <a:spcBef>
-                          <a:spcPts val="0"/>
-                        </a:spcBef>
-                        <a:spcAft>
-                          <a:spcPts val="0"/>
-                        </a:spcAft>
-                        <a:buClrTx/>
-                        <a:buSzTx/>
-                        <a:buFontTx/>
-                        <a:buNone/>
-                        <a:tabLst/>
-                        <a:defRPr/>
-                      </a:pPr>
-                      <a:endParaRPr lang="en-US" sz="1200" b="0" i="0" u="none" strike="noStrike" dirty="0">
-                        <a:solidFill>
-                          <a:schemeClr val="tx2"/>
-                        </a:solidFill>
-                        <a:effectLst/>
-                        <a:latin typeface="Calibri Regular"/>
-                      </a:endParaRPr>
-                    </a:p>
-                  </a:txBody>
-                  <a:tcPr marL="108000" marR="108000" marT="72000" marB="72000" anchor="ctr">
-                    <a:lnL w="9525" cap="flat" cmpd="sng" algn="ctr">
-                      <a:noFill/>
-                      <a:prstDash val="solid"/>
-                    </a:lnL>
-                    <a:lnR>
-                      <a:noFill/>
-                    </a:lnR>
-                    <a:lnT w="12700" cap="flat" cmpd="sng" algn="ctr">
-                      <a:solidFill>
-                        <a:schemeClr val="tx1">
-                          <a:lumMod val="40000"/>
-                          <a:lumOff val="60000"/>
-                        </a:schemeClr>
-                      </a:solidFill>
-                      <a:prstDash val="sysDot"/>
-                      <a:round/>
-                      <a:headEnd type="none" w="med" len="med"/>
-                      <a:tailEnd type="none" w="med" len="med"/>
-                    </a:lnT>
-                    <a:lnB w="12700" cap="flat" cmpd="sng" algn="ctr">
-                      <a:noFill/>
-                      <a:prstDash val="solid"/>
-                      <a:round/>
-                      <a:headEnd type="none" w="med" len="med"/>
-                      <a:tailEnd type="none" w="med" len="med"/>
-                    </a:lnB>
-                    <a:lnTlToBr w="12700" cmpd="sng">
-                      <a:noFill/>
-                      <a:prstDash val="solid"/>
-                    </a:lnTlToBr>
-                    <a:lnBlToTr w="12700" cmpd="sng">
-                      <a:noFill/>
-                      <a:prstDash val="solid"/>
-                    </a:lnBlToTr>
-                    <a:solidFill>
-                      <a:schemeClr val="bg1"/>
-                    </a:solidFill>
-                  </a:tcPr>
-                </a:tc>
-                <a:tc>
-                  <a:txBody>
-                    <a:bodyPr/>
-                    <a:lstStyle/>
-                    <a:p>
-                      <a:pPr marL="0" marR="0" lvl="0" indent="0" algn="r" defTabSz="914400" rtl="0" eaLnBrk="1" fontAlgn="b" latinLnBrk="0" hangingPunct="1">
-                        <a:lnSpc>
-                          <a:spcPct val="100000"/>
-                        </a:lnSpc>
-                        <a:spcBef>
-                          <a:spcPts val="0"/>
-                        </a:spcBef>
-                        <a:spcAft>
-                          <a:spcPts val="0"/>
-                        </a:spcAft>
-                        <a:buClrTx/>
-                        <a:buSzTx/>
-                        <a:buFontTx/>
-                        <a:buNone/>
-                        <a:tabLst/>
-                        <a:defRPr/>
-                      </a:pPr>
-                      <a:endParaRPr lang="en-US" sz="1200" b="0" i="0" u="none" strike="noStrike" kern="1200" dirty="0">
-                        <a:solidFill>
-                          <a:schemeClr val="tx2"/>
-                        </a:solidFill>
-                        <a:effectLst/>
-                        <a:latin typeface="Calibri Bold"/>
-                        <a:ea typeface="+mn-ea"/>
-                        <a:cs typeface="+mn-cs"/>
-                      </a:endParaRPr>
-                    </a:p>
-                  </a:txBody>
-                  <a:tcPr marL="108000" marR="108000" marT="72000" marB="72000" anchor="ctr">
-                    <a:lnL>
-                      <a:noFill/>
-                    </a:lnL>
-                    <a:lnR>
-                      <a:noFill/>
-                    </a:lnR>
-                    <a:lnT w="12700" cap="flat" cmpd="sng" algn="ctr">
-                      <a:solidFill>
-                        <a:schemeClr val="tx1">
-                          <a:lumMod val="40000"/>
-                          <a:lumOff val="60000"/>
-                        </a:schemeClr>
-                      </a:solidFill>
-                      <a:prstDash val="sysDot"/>
-                      <a:round/>
-                      <a:headEnd type="none" w="med" len="med"/>
-                      <a:tailEnd type="none" w="med" len="med"/>
-                    </a:lnT>
-                    <a:lnB w="12700" cap="flat" cmpd="sng" algn="ctr">
-                      <a:noFill/>
-                      <a:prstDash val="solid"/>
-                      <a:round/>
-                      <a:headEnd type="none" w="med" len="med"/>
-                      <a:tailEnd type="none" w="med" len="med"/>
-                    </a:lnB>
-                    <a:lnTlToBr w="12700" cmpd="sng">
-                      <a:noFill/>
-                      <a:prstDash val="solid"/>
-                    </a:lnTlToBr>
-                    <a:lnBlToTr w="12700" cmpd="sng">
-                      <a:noFill/>
-                      <a:prstDash val="solid"/>
-                    </a:lnBlToTr>
-                    <a:solidFill>
-                      <a:srgbClr val="FEF5BA"/>
-                    </a:solidFill>
-                  </a:tcPr>
-                </a:tc>
-                <a:tc>
-                  <a:txBody>
-                    <a:bodyPr/>
-                    <a:lstStyle/>
-                    <a:p>
-                      <a:pPr algn="r" fontAlgn="b"/>
-                      <a:endParaRPr lang="en-US" sz="1200" b="0" i="0" u="none" strike="noStrike" dirty="0">
-                        <a:solidFill>
-                          <a:schemeClr val="tx1">
-                            <a:lumMod val="60000"/>
-                            <a:lumOff val="40000"/>
-                          </a:schemeClr>
-                        </a:solidFill>
-                        <a:effectLst/>
-                        <a:latin typeface="Calibri Regular"/>
-                      </a:endParaRPr>
-                    </a:p>
-                  </a:txBody>
-                  <a:tcPr marL="108000" marR="108000" marT="72000" marB="72000" anchor="ctr">
-                    <a:lnL>
-                      <a:noFill/>
-                    </a:lnL>
-                    <a:lnR w="9525" cap="flat" cmpd="sng" algn="ctr">
-                      <a:noFill/>
-                      <a:prstDash val="solid"/>
-                    </a:lnR>
-                    <a:lnT w="12700" cap="flat" cmpd="sng" algn="ctr">
-                      <a:solidFill>
-                        <a:schemeClr val="tx1">
-                          <a:lumMod val="40000"/>
-                          <a:lumOff val="60000"/>
-                        </a:schemeClr>
-                      </a:solidFill>
-                      <a:prstDash val="sysDot"/>
-                      <a:round/>
-                      <a:headEnd type="none" w="med" len="med"/>
-                      <a:tailEnd type="none" w="med" len="med"/>
-                    </a:lnT>
-                    <a:lnB w="12700" cap="flat" cmpd="sng" algn="ctr">
-                      <a:noFill/>
-                      <a:prstDash val="solid"/>
-                      <a:round/>
-                      <a:headEnd type="none" w="med" len="med"/>
-                      <a:tailEnd type="none" w="med" len="med"/>
-                    </a:lnB>
-                    <a:lnTlToBr w="12700" cmpd="sng">
-                      <a:noFill/>
-                      <a:prstDash val="solid"/>
-                    </a:lnTlToBr>
-                    <a:lnBlToTr w="12700" cmpd="sng">
-                      <a:noFill/>
-                      <a:prstDash val="solid"/>
-                    </a:lnBlToTr>
-                    <a:solidFill>
-                      <a:schemeClr val="bg1"/>
-                    </a:solidFill>
-                  </a:tcPr>
-                </a:tc>
-                <a:tc>
-                  <a:txBody>
-                    <a:bodyPr/>
-                    <a:lstStyle/>
-                    <a:p>
-                      <a:pPr marL="0" algn="r" defTabSz="914400" rtl="0" eaLnBrk="1" fontAlgn="b" latinLnBrk="0" hangingPunct="1"/>
-                      <a:endParaRPr lang="en-US" sz="1200" b="0" i="0" u="none" strike="noStrike" kern="1200" dirty="0">
-                        <a:solidFill>
-                          <a:schemeClr val="tx1">
-                            <a:lumMod val="60000"/>
-                            <a:lumOff val="40000"/>
-                          </a:schemeClr>
-                        </a:solidFill>
-                        <a:effectLst/>
-                        <a:latin typeface="Calibri Regular"/>
-                        <a:ea typeface="+mn-ea"/>
-                        <a:cs typeface="+mn-cs"/>
-                      </a:endParaRPr>
-                    </a:p>
-                  </a:txBody>
-                  <a:tcPr marL="108000" marR="108000" marT="72000" marB="72000" anchor="ctr">
-                    <a:lnL>
-                      <a:noFill/>
-                    </a:lnL>
-                    <a:lnR w="9525" cap="flat" cmpd="sng" algn="ctr">
-                      <a:noFill/>
-                      <a:prstDash val="solid"/>
-                    </a:lnR>
-                    <a:lnT w="12700" cap="flat" cmpd="sng" algn="ctr">
-                      <a:solidFill>
-                        <a:schemeClr val="tx1">
-                          <a:lumMod val="40000"/>
-                          <a:lumOff val="60000"/>
-                        </a:schemeClr>
-                      </a:solidFill>
-                      <a:prstDash val="sysDot"/>
-                      <a:round/>
-                      <a:headEnd type="none" w="med" len="med"/>
-                      <a:tailEnd type="none" w="med" len="med"/>
-                    </a:lnT>
-                    <a:lnB w="12700" cap="flat" cmpd="sng" algn="ctr">
-                      <a:noFill/>
-                      <a:prstDash val="solid"/>
-                      <a:round/>
-                      <a:headEnd type="none" w="med" len="med"/>
-                      <a:tailEnd type="none" w="med" len="med"/>
-                    </a:lnB>
-                    <a:lnTlToBr w="12700" cmpd="sng">
-                      <a:noFill/>
-                      <a:prstDash val="solid"/>
-                    </a:lnTlToBr>
-                    <a:lnBlToTr w="12700" cmpd="sng">
-                      <a:noFill/>
-                      <a:prstDash val="solid"/>
-                    </a:lnBlToTr>
-                    <a:solidFill>
-                      <a:schemeClr val="bg1"/>
-                    </a:solidFill>
-                  </a:tcPr>
-                </a:tc>
-                <a:tc>
-                  <a:txBody>
-                    <a:bodyPr/>
-                    <a:lstStyle/>
-                    <a:p>
-                      <a:pPr marL="0" algn="r" defTabSz="914400" rtl="0" eaLnBrk="1" fontAlgn="b" latinLnBrk="0" hangingPunct="1"/>
+                      <a:pPr marL="0" algn="l" defTabSz="914400" rtl="0" eaLnBrk="1" fontAlgn="b" latinLnBrk="0" hangingPunct="1"/>
                       <a:endParaRPr lang="en-US" sz="1200" b="0" i="0" u="none" strike="noStrike" kern="1200" dirty="0">
                         <a:solidFill>
                           <a:schemeClr val="tx1">
@@ -27300,15 +27306,6 @@
 </file>
 
 <file path=customXml/item2.xml><?xml version="1.0" encoding="utf-8"?>
-<?mso-contentType ?>
-<FormTemplates xmlns="http://schemas.microsoft.com/sharepoint/v3/contenttype/forms">
-  <Display>DocumentLibraryForm</Display>
-  <Edit>DocumentLibraryForm</Edit>
-  <New>DocumentLibraryForm</New>
-</FormTemplates>
-</file>
-
-<file path=customXml/item3.xml><?xml version="1.0" encoding="utf-8"?>
 <p:properties xmlns:p="http://schemas.microsoft.com/office/2006/metadata/properties" xmlns:xsi="http://www.w3.org/2001/XMLSchema-instance" xmlns:pc="http://schemas.microsoft.com/office/infopath/2007/PartnerControls">
   <documentManagement>
     <lcf76f155ced4ddcb4097134ff3c332f xmlns="fa937df2-abe2-4d38-b5f4-c228acba3827">
@@ -27317,6 +27314,15 @@
     <TaxCatchAll xmlns="bc8ba18a-4a58-4ad2-bfc0-6516af8e7dc2" xsi:nil="true"/>
   </documentManagement>
 </p:properties>
+</file>
+
+<file path=customXml/item3.xml><?xml version="1.0" encoding="utf-8"?>
+<?mso-contentType ?>
+<FormTemplates xmlns="http://schemas.microsoft.com/sharepoint/v3/contenttype/forms">
+  <Display>DocumentLibraryForm</Display>
+  <Edit>DocumentLibraryForm</Edit>
+  <New>DocumentLibraryForm</New>
+</FormTemplates>
 </file>
 
 <file path=customXml/itemProps1.xml><?xml version="1.0" encoding="utf-8"?>
@@ -27339,14 +27345,6 @@
 </file>
 
 <file path=customXml/itemProps2.xml><?xml version="1.0" encoding="utf-8"?>
-<ds:datastoreItem xmlns:ds="http://schemas.openxmlformats.org/officeDocument/2006/customXml" ds:itemID="{570928F0-D7CA-4732-B7F3-1F945720D0AA}">
-  <ds:schemaRefs>
-    <ds:schemaRef ds:uri="http://schemas.microsoft.com/sharepoint/v3/contenttype/forms"/>
-  </ds:schemaRefs>
-</ds:datastoreItem>
-</file>
-
-<file path=customXml/itemProps3.xml><?xml version="1.0" encoding="utf-8"?>
 <ds:datastoreItem xmlns:ds="http://schemas.openxmlformats.org/officeDocument/2006/customXml" ds:itemID="{4B629362-CF15-4610-8FAC-A8E699942233}">
   <ds:schemaRefs>
     <ds:schemaRef ds:uri="http://schemas.microsoft.com/office/2006/documentManagement/types"/>
@@ -27361,4 +27359,12 @@
     <ds:schemaRef ds:uri="http://purl.org/dc/dcmitype/"/>
   </ds:schemaRefs>
 </ds:datastoreItem>
+</file>
+
+<file path=customXml/itemProps3.xml><?xml version="1.0" encoding="utf-8"?>
+<ds:datastoreItem xmlns:ds="http://schemas.openxmlformats.org/officeDocument/2006/customXml" ds:itemID="{570928F0-D7CA-4732-B7F3-1F945720D0AA}">
+  <ds:schemaRefs>
+    <ds:schemaRef ds:uri="http://schemas.microsoft.com/sharepoint/v3/contenttype/forms"/>
+  </ds:schemaRefs>
+</ds:datastoreItem>
 </file>
</xml_diff>

<commit_message>
Initial working implementation for duplication toplist
</commit_message>
<xml_diff>
--- a/report-generator/src/report_generator/presets/templates/refactoring-candidates.pptx
+++ b/report-generator/src/report_generator/presets/templates/refactoring-candidates.pptx
@@ -21047,14 +21047,14 @@
           <p:nvPr>
             <p:extLst>
               <p:ext uri="{D42A27DB-BD31-4B8C-83A1-F6EECF244321}">
-                <p14:modId xmlns:p14="http://schemas.microsoft.com/office/powerpoint/2010/main" val="3365033968"/>
+                <p14:modId xmlns:p14="http://schemas.microsoft.com/office/powerpoint/2010/main" val="505544800"/>
               </p:ext>
             </p:extLst>
           </p:nvPr>
         </p:nvGraphicFramePr>
         <p:xfrm>
           <a:off x="514373" y="1366988"/>
-          <a:ext cx="11231295" cy="5116560"/>
+          <a:ext cx="11231294" cy="4933680"/>
         </p:xfrm>
         <a:graphic>
           <a:graphicData uri="http://schemas.openxmlformats.org/drawingml/2006/table">
@@ -21064,35 +21064,28 @@
                 <a:tableStyleId>{F2DE63D5-997A-4646-A377-4702673A728D}</a:tableStyleId>
               </a:tblPr>
               <a:tblGrid>
-                <a:gridCol w="5747279">
+                <a:gridCol w="7004027">
                   <a:extLst>
                     <a:ext uri="{9D8B030D-6E8A-4147-A177-3AD203B41FA5}">
                       <a16:colId xmlns:a16="http://schemas.microsoft.com/office/drawing/2014/main" val="20000"/>
                     </a:ext>
                   </a:extLst>
                 </a:gridCol>
-                <a:gridCol w="1483658">
+                <a:gridCol w="1410957">
                   <a:extLst>
                     <a:ext uri="{9D8B030D-6E8A-4147-A177-3AD203B41FA5}">
                       <a16:colId xmlns:a16="http://schemas.microsoft.com/office/drawing/2014/main" val="20001"/>
                     </a:ext>
                   </a:extLst>
                 </a:gridCol>
-                <a:gridCol w="1040881">
+                <a:gridCol w="1211322">
                   <a:extLst>
                     <a:ext uri="{9D8B030D-6E8A-4147-A177-3AD203B41FA5}">
                       <a16:colId xmlns:a16="http://schemas.microsoft.com/office/drawing/2014/main" val="20002"/>
                     </a:ext>
                   </a:extLst>
                 </a:gridCol>
-                <a:gridCol w="1580322">
-                  <a:extLst>
-                    <a:ext uri="{9D8B030D-6E8A-4147-A177-3AD203B41FA5}">
-                      <a16:colId xmlns:a16="http://schemas.microsoft.com/office/drawing/2014/main" val="3286041723"/>
-                    </a:ext>
-                  </a:extLst>
-                </a:gridCol>
-                <a:gridCol w="1379155">
+                <a:gridCol w="1604988">
                   <a:extLst>
                     <a:ext uri="{9D8B030D-6E8A-4147-A177-3AD203B41FA5}">
                       <a16:colId xmlns:a16="http://schemas.microsoft.com/office/drawing/2014/main" val="2857446439"/>
@@ -21100,7 +21093,7 @@
                   </a:extLst>
                 </a:gridCol>
               </a:tblGrid>
-              <a:tr h="250945">
+              <a:tr h="305820">
                 <a:tc>
                   <a:txBody>
                     <a:bodyPr/>
@@ -21243,7 +21236,7 @@
                     <a:bodyPr/>
                     <a:lstStyle/>
                     <a:p>
-                      <a:pPr algn="r"/>
+                      <a:pPr algn="l"/>
                       <a:r>
                         <a:rPr lang="nl-NL" sz="1400" b="1" noProof="0" dirty="0">
                           <a:solidFill>
@@ -21251,7 +21244,7 @@
                           </a:solidFill>
                           <a:latin typeface="+mn-lt"/>
                         </a:rPr>
-                        <a:t>Same file</a:t>
+                        <a:t>Level</a:t>
                       </a:r>
                       <a:endParaRPr lang="nl-NL" sz="1400" b="1" i="0" noProof="0" dirty="0">
                         <a:solidFill>
@@ -21260,56 +21253,6 @@
                         <a:latin typeface="+mn-lt"/>
                         <a:cs typeface="TheSans B4 SemiLight"/>
                       </a:endParaRPr>
-                    </a:p>
-                  </a:txBody>
-                  <a:tcPr marL="108000" marR="108000" marT="72000" marB="72000" anchor="b">
-                    <a:lnL>
-                      <a:noFill/>
-                    </a:lnL>
-                    <a:lnR w="9525" cap="flat" cmpd="sng" algn="ctr">
-                      <a:noFill/>
-                      <a:prstDash val="solid"/>
-                    </a:lnR>
-                    <a:lnT w="9525" cap="flat" cmpd="sng" algn="ctr">
-                      <a:noFill/>
-                      <a:prstDash val="solid"/>
-                    </a:lnT>
-                    <a:lnB w="19050" cap="flat" cmpd="sng" algn="ctr">
-                      <a:noFill/>
-                      <a:prstDash val="sysDot"/>
-                      <a:round/>
-                      <a:headEnd type="none" w="med" len="med"/>
-                      <a:tailEnd type="none" w="med" len="med"/>
-                    </a:lnB>
-                    <a:lnTlToBr w="12700" cmpd="sng">
-                      <a:noFill/>
-                      <a:prstDash val="solid"/>
-                    </a:lnTlToBr>
-                    <a:lnBlToTr w="12700" cmpd="sng">
-                      <a:noFill/>
-                      <a:prstDash val="solid"/>
-                    </a:lnBlToTr>
-                    <a:solidFill>
-                      <a:schemeClr val="tx2"/>
-                    </a:solidFill>
-                  </a:tcPr>
-                </a:tc>
-                <a:tc>
-                  <a:txBody>
-                    <a:bodyPr/>
-                    <a:lstStyle/>
-                    <a:p>
-                      <a:pPr algn="r"/>
-                      <a:r>
-                        <a:rPr lang="nl-NL" sz="1400" b="1" i="0" noProof="0" dirty="0">
-                          <a:solidFill>
-                            <a:schemeClr val="bg1"/>
-                          </a:solidFill>
-                          <a:latin typeface="+mn-lt"/>
-                          <a:cs typeface="TheSans B4 SemiLight"/>
-                        </a:rPr>
-                        <a:t>Same component</a:t>
-                      </a:r>
                     </a:p>
                   </a:txBody>
                   <a:tcPr marL="108000" marR="108000" marT="72000" marB="72000" anchor="b">
@@ -21400,7 +21343,7 @@
                   </a:ext>
                 </a:extLst>
               </a:tr>
-              <a:tr h="357962">
+              <a:tr h="306335">
                 <a:tc>
                   <a:txBody>
                     <a:bodyPr/>
@@ -21555,7 +21498,7 @@
                     <a:bodyPr/>
                     <a:lstStyle/>
                     <a:p>
-                      <a:pPr algn="r" fontAlgn="b"/>
+                      <a:pPr algn="l" fontAlgn="b"/>
                       <a:r>
                         <a:rPr lang="en-US" sz="1200" b="0" i="0" u="none" strike="noStrike" dirty="0">
                           <a:solidFill>
@@ -21566,69 +21509,6 @@
                           </a:solidFill>
                           <a:effectLst/>
                           <a:latin typeface="Calibri Regular"/>
-                        </a:rPr>
-                        <a:t>Example Style</a:t>
-                      </a:r>
-                    </a:p>
-                  </a:txBody>
-                  <a:tcPr marL="108000" marR="108000" marT="72000" marB="72000" anchor="ctr">
-                    <a:lnL>
-                      <a:noFill/>
-                    </a:lnL>
-                    <a:lnR w="9525" cap="flat" cmpd="sng" algn="ctr">
-                      <a:noFill/>
-                      <a:prstDash val="solid"/>
-                    </a:lnR>
-                    <a:lnT w="19050" cap="flat" cmpd="sng" algn="ctr">
-                      <a:noFill/>
-                      <a:prstDash val="sysDot"/>
-                      <a:round/>
-                      <a:headEnd type="none" w="med" len="med"/>
-                      <a:tailEnd type="none" w="med" len="med"/>
-                    </a:lnT>
-                    <a:lnB w="12700" cap="flat" cmpd="sng" algn="ctr">
-                      <a:solidFill>
-                        <a:schemeClr val="tx1">
-                          <a:lumMod val="40000"/>
-                          <a:lumOff val="60000"/>
-                        </a:schemeClr>
-                      </a:solidFill>
-                      <a:prstDash val="sysDot"/>
-                      <a:round/>
-                      <a:headEnd type="none" w="med" len="med"/>
-                      <a:tailEnd type="none" w="med" len="med"/>
-                    </a:lnB>
-                    <a:lnTlToBr w="12700" cmpd="sng">
-                      <a:noFill/>
-                      <a:prstDash val="solid"/>
-                    </a:lnTlToBr>
-                    <a:lnBlToTr w="12700" cmpd="sng">
-                      <a:noFill/>
-                      <a:prstDash val="solid"/>
-                    </a:lnBlToTr>
-                    <a:solidFill>
-                      <a:schemeClr val="bg1"/>
-                    </a:solidFill>
-                  </a:tcPr>
-                </a:tc>
-                <a:tc>
-                  <a:txBody>
-                    <a:bodyPr/>
-                    <a:lstStyle/>
-                    <a:p>
-                      <a:pPr marL="0" algn="r" defTabSz="914400" rtl="0" eaLnBrk="1" fontAlgn="b" latinLnBrk="0" hangingPunct="1"/>
-                      <a:r>
-                        <a:rPr lang="en-US" sz="1200" b="0" i="0" u="none" strike="noStrike" kern="1200" dirty="0">
-                          <a:solidFill>
-                            <a:schemeClr val="tx1">
-                              <a:lumMod val="60000"/>
-                              <a:lumOff val="40000"/>
-                            </a:schemeClr>
-                          </a:solidFill>
-                          <a:effectLst/>
-                          <a:latin typeface="Calibri Regular"/>
-                          <a:ea typeface="+mn-ea"/>
-                          <a:cs typeface="+mn-cs"/>
                         </a:rPr>
                         <a:t>Example Style</a:t>
                       </a:r>
@@ -21743,7 +21623,7 @@
                   </a:ext>
                 </a:extLst>
               </a:tr>
-              <a:tr h="229541">
+              <a:tr h="279736">
                 <a:tc>
                   <a:txBody>
                     <a:bodyPr/>
@@ -21886,7 +21766,7 @@
                     <a:bodyPr/>
                     <a:lstStyle/>
                     <a:p>
-                      <a:pPr marL="0" marR="0" indent="0" algn="r" defTabSz="457200" rtl="0" eaLnBrk="1" fontAlgn="b" latinLnBrk="0" hangingPunct="1">
+                      <a:pPr marL="0" marR="0" indent="0" algn="l" defTabSz="457200" rtl="0" eaLnBrk="1" fontAlgn="b" latinLnBrk="0" hangingPunct="1">
                         <a:lnSpc>
                           <a:spcPct val="100000"/>
                         </a:lnSpc>
@@ -21965,71 +21845,6 @@
                     <a:bodyPr/>
                     <a:lstStyle/>
                     <a:p>
-                      <a:pPr marL="0" algn="r" defTabSz="914400" rtl="0" eaLnBrk="1" fontAlgn="b" latinLnBrk="0" hangingPunct="1"/>
-                      <a:endParaRPr lang="en-US" sz="1200" b="0" i="0" u="none" strike="noStrike" kern="1200" dirty="0">
-                        <a:solidFill>
-                          <a:schemeClr val="tx1">
-                            <a:lumMod val="60000"/>
-                            <a:lumOff val="40000"/>
-                          </a:schemeClr>
-                        </a:solidFill>
-                        <a:effectLst/>
-                        <a:latin typeface="Calibri Regular"/>
-                        <a:ea typeface="+mn-ea"/>
-                        <a:cs typeface="+mn-cs"/>
-                      </a:endParaRPr>
-                    </a:p>
-                  </a:txBody>
-                  <a:tcPr marL="108000" marR="108000" marT="72000" marB="72000" anchor="ctr">
-                    <a:lnL>
-                      <a:noFill/>
-                    </a:lnL>
-                    <a:lnR w="9525" cap="flat" cmpd="sng" algn="ctr">
-                      <a:noFill/>
-                      <a:prstDash val="solid"/>
-                    </a:lnR>
-                    <a:lnT w="12700" cap="flat" cmpd="sng" algn="ctr">
-                      <a:solidFill>
-                        <a:schemeClr val="tx1">
-                          <a:lumMod val="40000"/>
-                          <a:lumOff val="60000"/>
-                        </a:schemeClr>
-                      </a:solidFill>
-                      <a:prstDash val="sysDot"/>
-                      <a:round/>
-                      <a:headEnd type="none" w="med" len="med"/>
-                      <a:tailEnd type="none" w="med" len="med"/>
-                    </a:lnT>
-                    <a:lnB w="12700" cap="flat" cmpd="sng" algn="ctr">
-                      <a:solidFill>
-                        <a:schemeClr val="tx1">
-                          <a:lumMod val="40000"/>
-                          <a:lumOff val="60000"/>
-                        </a:schemeClr>
-                      </a:solidFill>
-                      <a:prstDash val="sysDot"/>
-                      <a:round/>
-                      <a:headEnd type="none" w="med" len="med"/>
-                      <a:tailEnd type="none" w="med" len="med"/>
-                    </a:lnB>
-                    <a:lnTlToBr w="12700" cmpd="sng">
-                      <a:noFill/>
-                      <a:prstDash val="solid"/>
-                    </a:lnTlToBr>
-                    <a:lnBlToTr w="12700" cmpd="sng">
-                      <a:noFill/>
-                      <a:prstDash val="solid"/>
-                    </a:lnBlToTr>
-                    <a:solidFill>
-                      <a:schemeClr val="bg1"/>
-                    </a:solidFill>
-                  </a:tcPr>
-                </a:tc>
-                <a:tc>
-                  <a:txBody>
-                    <a:bodyPr/>
-                    <a:lstStyle/>
-                    <a:p>
                       <a:pPr marL="0" algn="l" defTabSz="914400" rtl="0" eaLnBrk="1" fontAlgn="b" latinLnBrk="0" hangingPunct="1"/>
                       <a:endParaRPr lang="en-US" sz="1200" b="0" i="0" u="none" strike="noStrike" kern="1200" dirty="0">
                         <a:solidFill>
@@ -22096,7 +21911,7 @@
                   </a:ext>
                 </a:extLst>
               </a:tr>
-              <a:tr h="229541">
+              <a:tr h="279736">
                 <a:tc>
                   <a:txBody>
                     <a:bodyPr/>
@@ -22239,7 +22054,7 @@
                     <a:bodyPr/>
                     <a:lstStyle/>
                     <a:p>
-                      <a:pPr algn="r" fontAlgn="b"/>
+                      <a:pPr algn="l" fontAlgn="b"/>
                       <a:endParaRPr lang="en-US" sz="1200" b="0" i="0" u="none" strike="noStrike" dirty="0">
                         <a:solidFill>
                           <a:schemeClr val="tx1">
@@ -22249,71 +22064,6 @@
                         </a:solidFill>
                         <a:effectLst/>
                         <a:latin typeface="Calibri Regular"/>
-                      </a:endParaRPr>
-                    </a:p>
-                  </a:txBody>
-                  <a:tcPr marL="108000" marR="108000" marT="72000" marB="72000" anchor="ctr">
-                    <a:lnL>
-                      <a:noFill/>
-                    </a:lnL>
-                    <a:lnR w="9525" cap="flat" cmpd="sng" algn="ctr">
-                      <a:noFill/>
-                      <a:prstDash val="solid"/>
-                    </a:lnR>
-                    <a:lnT w="12700" cap="flat" cmpd="sng" algn="ctr">
-                      <a:solidFill>
-                        <a:schemeClr val="tx1">
-                          <a:lumMod val="40000"/>
-                          <a:lumOff val="60000"/>
-                        </a:schemeClr>
-                      </a:solidFill>
-                      <a:prstDash val="sysDot"/>
-                      <a:round/>
-                      <a:headEnd type="none" w="med" len="med"/>
-                      <a:tailEnd type="none" w="med" len="med"/>
-                    </a:lnT>
-                    <a:lnB w="12700" cap="flat" cmpd="sng" algn="ctr">
-                      <a:solidFill>
-                        <a:schemeClr val="tx1">
-                          <a:lumMod val="40000"/>
-                          <a:lumOff val="60000"/>
-                        </a:schemeClr>
-                      </a:solidFill>
-                      <a:prstDash val="sysDot"/>
-                      <a:round/>
-                      <a:headEnd type="none" w="med" len="med"/>
-                      <a:tailEnd type="none" w="med" len="med"/>
-                    </a:lnB>
-                    <a:lnTlToBr w="12700" cmpd="sng">
-                      <a:noFill/>
-                      <a:prstDash val="solid"/>
-                    </a:lnTlToBr>
-                    <a:lnBlToTr w="12700" cmpd="sng">
-                      <a:noFill/>
-                      <a:prstDash val="solid"/>
-                    </a:lnBlToTr>
-                    <a:solidFill>
-                      <a:schemeClr val="bg1"/>
-                    </a:solidFill>
-                  </a:tcPr>
-                </a:tc>
-                <a:tc>
-                  <a:txBody>
-                    <a:bodyPr/>
-                    <a:lstStyle/>
-                    <a:p>
-                      <a:pPr marL="0" algn="r" defTabSz="914400" rtl="0" eaLnBrk="1" fontAlgn="b" latinLnBrk="0" hangingPunct="1"/>
-                      <a:endParaRPr lang="en-US" sz="1200" b="0" i="0" u="none" strike="noStrike" kern="1200" dirty="0">
-                        <a:solidFill>
-                          <a:schemeClr val="tx1">
-                            <a:lumMod val="60000"/>
-                            <a:lumOff val="40000"/>
-                          </a:schemeClr>
-                        </a:solidFill>
-                        <a:effectLst/>
-                        <a:latin typeface="Calibri Regular"/>
-                        <a:ea typeface="+mn-ea"/>
-                        <a:cs typeface="+mn-cs"/>
                       </a:endParaRPr>
                     </a:p>
                   </a:txBody>
@@ -22433,362 +22183,7 @@
                   </a:ext>
                 </a:extLst>
               </a:tr>
-              <a:tr h="229541">
-                <a:tc>
-                  <a:txBody>
-                    <a:bodyPr/>
-                    <a:lstStyle/>
-                    <a:p>
-                      <a:pPr algn="l" fontAlgn="b"/>
-                      <a:endParaRPr lang="en-US" sz="1200" b="0" i="0" u="none" strike="noStrike" dirty="0">
-                        <a:solidFill>
-                          <a:schemeClr val="tx2"/>
-                        </a:solidFill>
-                        <a:effectLst/>
-                        <a:latin typeface="Calibri Regular"/>
-                      </a:endParaRPr>
-                    </a:p>
-                  </a:txBody>
-                  <a:tcPr marL="108000" marR="108000" marT="72000" marB="72000" anchor="ctr">
-                    <a:lnL w="9525" cap="flat" cmpd="sng" algn="ctr">
-                      <a:noFill/>
-                      <a:prstDash val="solid"/>
-                    </a:lnL>
-                    <a:lnR>
-                      <a:noFill/>
-                    </a:lnR>
-                    <a:lnT w="12700" cap="flat" cmpd="sng" algn="ctr">
-                      <a:solidFill>
-                        <a:schemeClr val="tx1">
-                          <a:lumMod val="40000"/>
-                          <a:lumOff val="60000"/>
-                        </a:schemeClr>
-                      </a:solidFill>
-                      <a:prstDash val="sysDot"/>
-                      <a:round/>
-                      <a:headEnd type="none" w="med" len="med"/>
-                      <a:tailEnd type="none" w="med" len="med"/>
-                    </a:lnT>
-                    <a:lnB w="12700" cap="flat" cmpd="sng" algn="ctr">
-                      <a:solidFill>
-                        <a:schemeClr val="tx1">
-                          <a:lumMod val="40000"/>
-                          <a:lumOff val="60000"/>
-                        </a:schemeClr>
-                      </a:solidFill>
-                      <a:prstDash val="sysDot"/>
-                      <a:round/>
-                      <a:headEnd type="none" w="med" len="med"/>
-                      <a:tailEnd type="none" w="med" len="med"/>
-                    </a:lnB>
-                    <a:lnTlToBr w="12700" cmpd="sng">
-                      <a:noFill/>
-                      <a:prstDash val="solid"/>
-                    </a:lnTlToBr>
-                    <a:lnBlToTr w="12700" cmpd="sng">
-                      <a:noFill/>
-                      <a:prstDash val="solid"/>
-                    </a:lnBlToTr>
-                    <a:solidFill>
-                      <a:schemeClr val="bg1"/>
-                    </a:solidFill>
-                  </a:tcPr>
-                </a:tc>
-                <a:tc>
-                  <a:txBody>
-                    <a:bodyPr/>
-                    <a:lstStyle/>
-                    <a:p>
-                      <a:pPr marL="0" marR="0" lvl="0" indent="0" algn="r" defTabSz="914400" rtl="0" eaLnBrk="1" fontAlgn="b" latinLnBrk="0" hangingPunct="1">
-                        <a:lnSpc>
-                          <a:spcPct val="100000"/>
-                        </a:lnSpc>
-                        <a:spcBef>
-                          <a:spcPts val="0"/>
-                        </a:spcBef>
-                        <a:spcAft>
-                          <a:spcPts val="0"/>
-                        </a:spcAft>
-                        <a:buClrTx/>
-                        <a:buSzTx/>
-                        <a:buFontTx/>
-                        <a:buNone/>
-                        <a:tabLst/>
-                        <a:defRPr/>
-                      </a:pPr>
-                      <a:r>
-                        <a:rPr lang="en-US" sz="1200" b="0" i="0" u="none" strike="noStrike" kern="1200" dirty="0">
-                          <a:solidFill>
-                            <a:schemeClr val="tx2"/>
-                          </a:solidFill>
-                          <a:effectLst/>
-                          <a:latin typeface="Calibri Bold"/>
-                          <a:ea typeface="+mn-ea"/>
-                          <a:cs typeface="+mn-cs"/>
-                        </a:rPr>
-                        <a:t>Style change</a:t>
-                      </a:r>
-                    </a:p>
-                  </a:txBody>
-                  <a:tcPr marL="108000" marR="108000" marT="72000" marB="72000" anchor="ctr">
-                    <a:lnL>
-                      <a:noFill/>
-                    </a:lnL>
-                    <a:lnR>
-                      <a:noFill/>
-                    </a:lnR>
-                    <a:lnT w="12700" cap="flat" cmpd="sng" algn="ctr">
-                      <a:solidFill>
-                        <a:schemeClr val="tx1">
-                          <a:lumMod val="40000"/>
-                          <a:lumOff val="60000"/>
-                        </a:schemeClr>
-                      </a:solidFill>
-                      <a:prstDash val="sysDot"/>
-                      <a:round/>
-                      <a:headEnd type="none" w="med" len="med"/>
-                      <a:tailEnd type="none" w="med" len="med"/>
-                    </a:lnT>
-                    <a:lnB w="12700" cap="flat" cmpd="sng" algn="ctr">
-                      <a:solidFill>
-                        <a:schemeClr val="tx1">
-                          <a:lumMod val="40000"/>
-                          <a:lumOff val="60000"/>
-                        </a:schemeClr>
-                      </a:solidFill>
-                      <a:prstDash val="sysDot"/>
-                      <a:round/>
-                      <a:headEnd type="none" w="med" len="med"/>
-                      <a:tailEnd type="none" w="med" len="med"/>
-                    </a:lnB>
-                    <a:lnTlToBr w="12700" cmpd="sng">
-                      <a:noFill/>
-                      <a:prstDash val="solid"/>
-                    </a:lnTlToBr>
-                    <a:lnBlToTr w="12700" cmpd="sng">
-                      <a:noFill/>
-                      <a:prstDash val="solid"/>
-                    </a:lnBlToTr>
-                    <a:solidFill>
-                      <a:srgbClr val="FEF5BA"/>
-                    </a:solidFill>
-                  </a:tcPr>
-                </a:tc>
-                <a:tc>
-                  <a:txBody>
-                    <a:bodyPr/>
-                    <a:lstStyle/>
-                    <a:p>
-                      <a:pPr marL="0" marR="0" lvl="0" indent="0" algn="r" defTabSz="914400" rtl="0" eaLnBrk="1" fontAlgn="b" latinLnBrk="0" hangingPunct="1">
-                        <a:lnSpc>
-                          <a:spcPct val="100000"/>
-                        </a:lnSpc>
-                        <a:spcBef>
-                          <a:spcPts val="0"/>
-                        </a:spcBef>
-                        <a:spcAft>
-                          <a:spcPts val="0"/>
-                        </a:spcAft>
-                        <a:buClrTx/>
-                        <a:buSzTx/>
-                        <a:buFontTx/>
-                        <a:buNone/>
-                        <a:tabLst/>
-                        <a:defRPr/>
-                      </a:pPr>
-                      <a:endParaRPr lang="en-US" sz="1200" b="0" i="0" u="none" strike="noStrike" kern="1200" dirty="0">
-                        <a:solidFill>
-                          <a:schemeClr val="tx2"/>
-                        </a:solidFill>
-                        <a:effectLst/>
-                        <a:latin typeface="Calibri Bold"/>
-                        <a:ea typeface="+mn-ea"/>
-                        <a:cs typeface="+mn-cs"/>
-                      </a:endParaRPr>
-                    </a:p>
-                  </a:txBody>
-                  <a:tcPr marL="108000" marR="108000" marT="72000" marB="72000" anchor="ctr">
-                    <a:lnL>
-                      <a:noFill/>
-                    </a:lnL>
-                    <a:lnR w="9525" cap="flat" cmpd="sng" algn="ctr">
-                      <a:noFill/>
-                      <a:prstDash val="solid"/>
-                    </a:lnR>
-                    <a:lnT w="12700" cap="flat" cmpd="sng" algn="ctr">
-                      <a:solidFill>
-                        <a:schemeClr val="tx1">
-                          <a:lumMod val="40000"/>
-                          <a:lumOff val="60000"/>
-                        </a:schemeClr>
-                      </a:solidFill>
-                      <a:prstDash val="sysDot"/>
-                      <a:round/>
-                      <a:headEnd type="none" w="med" len="med"/>
-                      <a:tailEnd type="none" w="med" len="med"/>
-                    </a:lnT>
-                    <a:lnB w="12700" cap="flat" cmpd="sng" algn="ctr">
-                      <a:solidFill>
-                        <a:schemeClr val="tx1">
-                          <a:lumMod val="40000"/>
-                          <a:lumOff val="60000"/>
-                        </a:schemeClr>
-                      </a:solidFill>
-                      <a:prstDash val="sysDot"/>
-                      <a:round/>
-                      <a:headEnd type="none" w="med" len="med"/>
-                      <a:tailEnd type="none" w="med" len="med"/>
-                    </a:lnB>
-                    <a:lnTlToBr w="12700" cmpd="sng">
-                      <a:noFill/>
-                      <a:prstDash val="solid"/>
-                    </a:lnTlToBr>
-                    <a:lnBlToTr w="12700" cmpd="sng">
-                      <a:noFill/>
-                      <a:prstDash val="solid"/>
-                    </a:lnBlToTr>
-                    <a:solidFill>
-                      <a:schemeClr val="bg1"/>
-                    </a:solidFill>
-                  </a:tcPr>
-                </a:tc>
-                <a:tc>
-                  <a:txBody>
-                    <a:bodyPr/>
-                    <a:lstStyle/>
-                    <a:p>
-                      <a:pPr marL="0" algn="r" defTabSz="914400" rtl="0" eaLnBrk="1" fontAlgn="b" latinLnBrk="0" hangingPunct="1"/>
-                      <a:endParaRPr lang="en-US" sz="1200" b="0" i="0" u="none" strike="noStrike" kern="1200" dirty="0">
-                        <a:solidFill>
-                          <a:schemeClr val="tx1">
-                            <a:lumMod val="60000"/>
-                            <a:lumOff val="40000"/>
-                          </a:schemeClr>
-                        </a:solidFill>
-                        <a:effectLst/>
-                        <a:latin typeface="Calibri Regular"/>
-                        <a:ea typeface="+mn-ea"/>
-                        <a:cs typeface="+mn-cs"/>
-                      </a:endParaRPr>
-                    </a:p>
-                  </a:txBody>
-                  <a:tcPr marL="108000" marR="108000" marT="72000" marB="72000" anchor="ctr">
-                    <a:lnL>
-                      <a:noFill/>
-                    </a:lnL>
-                    <a:lnR w="9525" cap="flat" cmpd="sng" algn="ctr">
-                      <a:noFill/>
-                      <a:prstDash val="solid"/>
-                    </a:lnR>
-                    <a:lnT w="12700" cap="flat" cmpd="sng" algn="ctr">
-                      <a:solidFill>
-                        <a:schemeClr val="tx1">
-                          <a:lumMod val="40000"/>
-                          <a:lumOff val="60000"/>
-                        </a:schemeClr>
-                      </a:solidFill>
-                      <a:prstDash val="sysDot"/>
-                      <a:round/>
-                      <a:headEnd type="none" w="med" len="med"/>
-                      <a:tailEnd type="none" w="med" len="med"/>
-                    </a:lnT>
-                    <a:lnB w="12700" cap="flat" cmpd="sng" algn="ctr">
-                      <a:solidFill>
-                        <a:schemeClr val="tx1">
-                          <a:lumMod val="40000"/>
-                          <a:lumOff val="60000"/>
-                        </a:schemeClr>
-                      </a:solidFill>
-                      <a:prstDash val="sysDot"/>
-                      <a:round/>
-                      <a:headEnd type="none" w="med" len="med"/>
-                      <a:tailEnd type="none" w="med" len="med"/>
-                    </a:lnB>
-                    <a:lnTlToBr w="12700" cmpd="sng">
-                      <a:noFill/>
-                      <a:prstDash val="solid"/>
-                    </a:lnTlToBr>
-                    <a:lnBlToTr w="12700" cmpd="sng">
-                      <a:noFill/>
-                      <a:prstDash val="solid"/>
-                    </a:lnBlToTr>
-                    <a:solidFill>
-                      <a:schemeClr val="bg1"/>
-                    </a:solidFill>
-                  </a:tcPr>
-                </a:tc>
-                <a:tc>
-                  <a:txBody>
-                    <a:bodyPr/>
-                    <a:lstStyle/>
-                    <a:p>
-                      <a:pPr marL="0" algn="l" defTabSz="914400" rtl="0" eaLnBrk="1" fontAlgn="b" latinLnBrk="0" hangingPunct="1"/>
-                      <a:endParaRPr lang="en-US" sz="1200" b="0" i="0" u="none" strike="noStrike" kern="1200" dirty="0">
-                        <a:solidFill>
-                          <a:schemeClr val="tx1">
-                            <a:lumMod val="60000"/>
-                            <a:lumOff val="40000"/>
-                          </a:schemeClr>
-                        </a:solidFill>
-                        <a:effectLst/>
-                        <a:latin typeface="Calibri Regular"/>
-                        <a:ea typeface="+mn-ea"/>
-                        <a:cs typeface="+mn-cs"/>
-                      </a:endParaRPr>
-                    </a:p>
-                  </a:txBody>
-                  <a:tcPr marL="108000" marR="108000" marT="72000" marB="72000" anchor="ctr">
-                    <a:lnL>
-                      <a:noFill/>
-                    </a:lnL>
-                    <a:lnR w="9525" cap="flat" cmpd="sng" algn="ctr">
-                      <a:noFill/>
-                      <a:prstDash val="solid"/>
-                    </a:lnR>
-                    <a:lnT w="12700" cap="flat" cmpd="sng" algn="ctr">
-                      <a:solidFill>
-                        <a:schemeClr val="tx1">
-                          <a:lumMod val="40000"/>
-                          <a:lumOff val="60000"/>
-                        </a:schemeClr>
-                      </a:solidFill>
-                      <a:prstDash val="sysDot"/>
-                      <a:round/>
-                      <a:headEnd type="none" w="med" len="med"/>
-                      <a:tailEnd type="none" w="med" len="med"/>
-                    </a:lnT>
-                    <a:lnB w="12700" cap="flat" cmpd="sng" algn="ctr">
-                      <a:solidFill>
-                        <a:schemeClr val="tx1">
-                          <a:lumMod val="40000"/>
-                          <a:lumOff val="60000"/>
-                        </a:schemeClr>
-                      </a:solidFill>
-                      <a:prstDash val="sysDot"/>
-                      <a:round/>
-                      <a:headEnd type="none" w="med" len="med"/>
-                      <a:tailEnd type="none" w="med" len="med"/>
-                    </a:lnB>
-                    <a:lnTlToBr w="12700" cmpd="sng">
-                      <a:noFill/>
-                      <a:prstDash val="solid"/>
-                    </a:lnTlToBr>
-                    <a:lnBlToTr w="12700" cmpd="sng">
-                      <a:noFill/>
-                      <a:prstDash val="solid"/>
-                    </a:lnBlToTr>
-                    <a:solidFill>
-                      <a:schemeClr val="bg1"/>
-                    </a:solidFill>
-                  </a:tcPr>
-                </a:tc>
-                <a:extLst>
-                  <a:ext uri="{0D108BD9-81ED-4DB2-BD59-A6C34878D82A}">
-                    <a16:rowId xmlns:a16="http://schemas.microsoft.com/office/drawing/2014/main" val="10004"/>
-                  </a:ext>
-                </a:extLst>
-              </a:tr>
-              <a:tr h="229541">
+              <a:tr h="279736">
                 <a:tc>
                   <a:txBody>
                     <a:bodyPr/>
@@ -22931,79 +22326,29 @@
                     <a:bodyPr/>
                     <a:lstStyle/>
                     <a:p>
-                      <a:pPr algn="r" fontAlgn="b"/>
-                      <a:endParaRPr lang="en-US" sz="1200" b="0" i="0" u="none" strike="noStrike" dirty="0">
+                      <a:pPr marL="0" marR="0" lvl="0" indent="0" algn="l" defTabSz="914400" rtl="0" eaLnBrk="1" fontAlgn="b" latinLnBrk="0" hangingPunct="1">
+                        <a:lnSpc>
+                          <a:spcPct val="100000"/>
+                        </a:lnSpc>
+                        <a:spcBef>
+                          <a:spcPts val="0"/>
+                        </a:spcBef>
+                        <a:spcAft>
+                          <a:spcPts val="0"/>
+                        </a:spcAft>
+                        <a:buClrTx/>
+                        <a:buSzTx/>
+                        <a:buFontTx/>
+                        <a:buNone/>
+                        <a:tabLst/>
+                        <a:defRPr/>
+                      </a:pPr>
+                      <a:endParaRPr lang="en-US" sz="1200" b="0" i="0" u="none" strike="noStrike" kern="1200" dirty="0">
                         <a:solidFill>
-                          <a:schemeClr val="tx1">
-                            <a:lumMod val="60000"/>
-                            <a:lumOff val="40000"/>
-                          </a:schemeClr>
+                          <a:schemeClr val="tx2"/>
                         </a:solidFill>
                         <a:effectLst/>
-                        <a:latin typeface="Calibri Regular"/>
-                      </a:endParaRPr>
-                    </a:p>
-                  </a:txBody>
-                  <a:tcPr marL="108000" marR="108000" marT="72000" marB="72000" anchor="ctr">
-                    <a:lnL>
-                      <a:noFill/>
-                    </a:lnL>
-                    <a:lnR w="9525" cap="flat" cmpd="sng" algn="ctr">
-                      <a:noFill/>
-                      <a:prstDash val="solid"/>
-                    </a:lnR>
-                    <a:lnT w="12700" cap="flat" cmpd="sng" algn="ctr">
-                      <a:solidFill>
-                        <a:schemeClr val="tx1">
-                          <a:lumMod val="40000"/>
-                          <a:lumOff val="60000"/>
-                        </a:schemeClr>
-                      </a:solidFill>
-                      <a:prstDash val="sysDot"/>
-                      <a:round/>
-                      <a:headEnd type="none" w="med" len="med"/>
-                      <a:tailEnd type="none" w="med" len="med"/>
-                    </a:lnT>
-                    <a:lnB w="12700" cap="flat" cmpd="sng" algn="ctr">
-                      <a:solidFill>
-                        <a:schemeClr val="tx1">
-                          <a:lumMod val="40000"/>
-                          <a:lumOff val="60000"/>
-                        </a:schemeClr>
-                      </a:solidFill>
-                      <a:prstDash val="sysDot"/>
-                      <a:round/>
-                      <a:headEnd type="none" w="med" len="med"/>
-                      <a:tailEnd type="none" w="med" len="med"/>
-                    </a:lnB>
-                    <a:lnTlToBr w="12700" cmpd="sng">
-                      <a:noFill/>
-                      <a:prstDash val="solid"/>
-                    </a:lnTlToBr>
-                    <a:lnBlToTr w="12700" cmpd="sng">
-                      <a:noFill/>
-                      <a:prstDash val="solid"/>
-                    </a:lnBlToTr>
-                    <a:solidFill>
-                      <a:schemeClr val="bg1"/>
-                    </a:solidFill>
-                  </a:tcPr>
-                </a:tc>
-                <a:tc>
-                  <a:txBody>
-                    <a:bodyPr/>
-                    <a:lstStyle/>
-                    <a:p>
-                      <a:pPr marL="0" algn="r" defTabSz="914400" rtl="0" eaLnBrk="1" fontAlgn="b" latinLnBrk="0" hangingPunct="1"/>
-                      <a:endParaRPr lang="en-US" sz="1200" b="0" i="0" u="none" strike="noStrike" kern="1200" dirty="0">
-                        <a:solidFill>
-                          <a:schemeClr val="tx1">
-                            <a:lumMod val="60000"/>
-                            <a:lumOff val="40000"/>
-                          </a:schemeClr>
-                        </a:solidFill>
-                        <a:effectLst/>
-                        <a:latin typeface="Calibri Regular"/>
+                        <a:latin typeface="Calibri Bold"/>
                         <a:ea typeface="+mn-ea"/>
                         <a:cs typeface="+mn-cs"/>
                       </a:endParaRPr>
@@ -23121,11 +22466,11 @@
                 </a:tc>
                 <a:extLst>
                   <a:ext uri="{0D108BD9-81ED-4DB2-BD59-A6C34878D82A}">
-                    <a16:rowId xmlns:a16="http://schemas.microsoft.com/office/drawing/2014/main" val="2001900654"/>
+                    <a16:rowId xmlns:a16="http://schemas.microsoft.com/office/drawing/2014/main" val="10004"/>
                   </a:ext>
                 </a:extLst>
               </a:tr>
-              <a:tr h="229541">
+              <a:tr h="279736">
                 <a:tc>
                   <a:txBody>
                     <a:bodyPr/>
@@ -23268,7 +22613,7 @@
                     <a:bodyPr/>
                     <a:lstStyle/>
                     <a:p>
-                      <a:pPr algn="r" fontAlgn="b"/>
+                      <a:pPr algn="l" fontAlgn="b"/>
                       <a:endParaRPr lang="en-US" sz="1200" b="0" i="0" u="none" strike="noStrike" dirty="0">
                         <a:solidFill>
                           <a:schemeClr val="tx1">
@@ -23278,71 +22623,6 @@
                         </a:solidFill>
                         <a:effectLst/>
                         <a:latin typeface="Calibri Regular"/>
-                      </a:endParaRPr>
-                    </a:p>
-                  </a:txBody>
-                  <a:tcPr marL="108000" marR="108000" marT="72000" marB="72000" anchor="ctr">
-                    <a:lnL>
-                      <a:noFill/>
-                    </a:lnL>
-                    <a:lnR w="9525" cap="flat" cmpd="sng" algn="ctr">
-                      <a:noFill/>
-                      <a:prstDash val="solid"/>
-                    </a:lnR>
-                    <a:lnT w="12700" cap="flat" cmpd="sng" algn="ctr">
-                      <a:solidFill>
-                        <a:schemeClr val="tx1">
-                          <a:lumMod val="40000"/>
-                          <a:lumOff val="60000"/>
-                        </a:schemeClr>
-                      </a:solidFill>
-                      <a:prstDash val="sysDot"/>
-                      <a:round/>
-                      <a:headEnd type="none" w="med" len="med"/>
-                      <a:tailEnd type="none" w="med" len="med"/>
-                    </a:lnT>
-                    <a:lnB w="12700" cap="flat" cmpd="sng" algn="ctr">
-                      <a:solidFill>
-                        <a:schemeClr val="tx1">
-                          <a:lumMod val="40000"/>
-                          <a:lumOff val="60000"/>
-                        </a:schemeClr>
-                      </a:solidFill>
-                      <a:prstDash val="sysDot"/>
-                      <a:round/>
-                      <a:headEnd type="none" w="med" len="med"/>
-                      <a:tailEnd type="none" w="med" len="med"/>
-                    </a:lnB>
-                    <a:lnTlToBr w="12700" cmpd="sng">
-                      <a:noFill/>
-                      <a:prstDash val="solid"/>
-                    </a:lnTlToBr>
-                    <a:lnBlToTr w="12700" cmpd="sng">
-                      <a:noFill/>
-                      <a:prstDash val="solid"/>
-                    </a:lnBlToTr>
-                    <a:solidFill>
-                      <a:schemeClr val="bg1"/>
-                    </a:solidFill>
-                  </a:tcPr>
-                </a:tc>
-                <a:tc>
-                  <a:txBody>
-                    <a:bodyPr/>
-                    <a:lstStyle/>
-                    <a:p>
-                      <a:pPr marL="0" algn="r" defTabSz="914400" rtl="0" eaLnBrk="1" fontAlgn="b" latinLnBrk="0" hangingPunct="1"/>
-                      <a:endParaRPr lang="en-US" sz="1200" b="0" i="0" u="none" strike="noStrike" kern="1200" dirty="0">
-                        <a:solidFill>
-                          <a:schemeClr val="tx1">
-                            <a:lumMod val="60000"/>
-                            <a:lumOff val="40000"/>
-                          </a:schemeClr>
-                        </a:solidFill>
-                        <a:effectLst/>
-                        <a:latin typeface="Calibri Regular"/>
-                        <a:ea typeface="+mn-ea"/>
-                        <a:cs typeface="+mn-cs"/>
                       </a:endParaRPr>
                     </a:p>
                   </a:txBody>
@@ -23458,11 +22738,11 @@
                 </a:tc>
                 <a:extLst>
                   <a:ext uri="{0D108BD9-81ED-4DB2-BD59-A6C34878D82A}">
-                    <a16:rowId xmlns:a16="http://schemas.microsoft.com/office/drawing/2014/main" val="928811833"/>
+                    <a16:rowId xmlns:a16="http://schemas.microsoft.com/office/drawing/2014/main" val="2001900654"/>
                   </a:ext>
                 </a:extLst>
               </a:tr>
-              <a:tr h="229541">
+              <a:tr h="279736">
                 <a:tc>
                   <a:txBody>
                     <a:bodyPr/>
@@ -23605,7 +22885,7 @@
                     <a:bodyPr/>
                     <a:lstStyle/>
                     <a:p>
-                      <a:pPr algn="r" fontAlgn="b"/>
+                      <a:pPr algn="l" fontAlgn="b"/>
                       <a:endParaRPr lang="en-US" sz="1200" b="0" i="0" u="none" strike="noStrike" dirty="0">
                         <a:solidFill>
                           <a:schemeClr val="tx1">
@@ -23615,71 +22895,6 @@
                         </a:solidFill>
                         <a:effectLst/>
                         <a:latin typeface="Calibri Regular"/>
-                      </a:endParaRPr>
-                    </a:p>
-                  </a:txBody>
-                  <a:tcPr marL="108000" marR="108000" marT="72000" marB="72000" anchor="ctr">
-                    <a:lnL>
-                      <a:noFill/>
-                    </a:lnL>
-                    <a:lnR w="9525" cap="flat" cmpd="sng" algn="ctr">
-                      <a:noFill/>
-                      <a:prstDash val="solid"/>
-                    </a:lnR>
-                    <a:lnT w="12700" cap="flat" cmpd="sng" algn="ctr">
-                      <a:solidFill>
-                        <a:schemeClr val="tx1">
-                          <a:lumMod val="40000"/>
-                          <a:lumOff val="60000"/>
-                        </a:schemeClr>
-                      </a:solidFill>
-                      <a:prstDash val="sysDot"/>
-                      <a:round/>
-                      <a:headEnd type="none" w="med" len="med"/>
-                      <a:tailEnd type="none" w="med" len="med"/>
-                    </a:lnT>
-                    <a:lnB w="12700" cap="flat" cmpd="sng" algn="ctr">
-                      <a:solidFill>
-                        <a:schemeClr val="tx1">
-                          <a:lumMod val="40000"/>
-                          <a:lumOff val="60000"/>
-                        </a:schemeClr>
-                      </a:solidFill>
-                      <a:prstDash val="sysDot"/>
-                      <a:round/>
-                      <a:headEnd type="none" w="med" len="med"/>
-                      <a:tailEnd type="none" w="med" len="med"/>
-                    </a:lnB>
-                    <a:lnTlToBr w="12700" cmpd="sng">
-                      <a:noFill/>
-                      <a:prstDash val="solid"/>
-                    </a:lnTlToBr>
-                    <a:lnBlToTr w="12700" cmpd="sng">
-                      <a:noFill/>
-                      <a:prstDash val="solid"/>
-                    </a:lnBlToTr>
-                    <a:solidFill>
-                      <a:schemeClr val="bg1"/>
-                    </a:solidFill>
-                  </a:tcPr>
-                </a:tc>
-                <a:tc>
-                  <a:txBody>
-                    <a:bodyPr/>
-                    <a:lstStyle/>
-                    <a:p>
-                      <a:pPr marL="0" algn="r" defTabSz="914400" rtl="0" eaLnBrk="1" fontAlgn="b" latinLnBrk="0" hangingPunct="1"/>
-                      <a:endParaRPr lang="en-US" sz="1200" b="0" i="0" u="none" strike="noStrike" kern="1200" dirty="0">
-                        <a:solidFill>
-                          <a:schemeClr val="tx1">
-                            <a:lumMod val="60000"/>
-                            <a:lumOff val="40000"/>
-                          </a:schemeClr>
-                        </a:solidFill>
-                        <a:effectLst/>
-                        <a:latin typeface="Calibri Regular"/>
-                        <a:ea typeface="+mn-ea"/>
-                        <a:cs typeface="+mn-cs"/>
                       </a:endParaRPr>
                     </a:p>
                   </a:txBody>
@@ -23795,11 +23010,11 @@
                 </a:tc>
                 <a:extLst>
                   <a:ext uri="{0D108BD9-81ED-4DB2-BD59-A6C34878D82A}">
-                    <a16:rowId xmlns:a16="http://schemas.microsoft.com/office/drawing/2014/main" val="4060795780"/>
+                    <a16:rowId xmlns:a16="http://schemas.microsoft.com/office/drawing/2014/main" val="928811833"/>
                   </a:ext>
                 </a:extLst>
               </a:tr>
-              <a:tr h="229541">
+              <a:tr h="279736">
                 <a:tc>
                   <a:txBody>
                     <a:bodyPr/>
@@ -23942,7 +23157,7 @@
                     <a:bodyPr/>
                     <a:lstStyle/>
                     <a:p>
-                      <a:pPr algn="r" fontAlgn="b"/>
+                      <a:pPr algn="l" fontAlgn="b"/>
                       <a:endParaRPr lang="en-US" sz="1200" b="0" i="0" u="none" strike="noStrike" dirty="0">
                         <a:solidFill>
                           <a:schemeClr val="tx1">
@@ -23952,71 +23167,6 @@
                         </a:solidFill>
                         <a:effectLst/>
                         <a:latin typeface="Calibri Regular"/>
-                      </a:endParaRPr>
-                    </a:p>
-                  </a:txBody>
-                  <a:tcPr marL="108000" marR="108000" marT="72000" marB="72000" anchor="ctr">
-                    <a:lnL>
-                      <a:noFill/>
-                    </a:lnL>
-                    <a:lnR w="9525" cap="flat" cmpd="sng" algn="ctr">
-                      <a:noFill/>
-                      <a:prstDash val="solid"/>
-                    </a:lnR>
-                    <a:lnT w="12700" cap="flat" cmpd="sng" algn="ctr">
-                      <a:solidFill>
-                        <a:schemeClr val="tx1">
-                          <a:lumMod val="40000"/>
-                          <a:lumOff val="60000"/>
-                        </a:schemeClr>
-                      </a:solidFill>
-                      <a:prstDash val="sysDot"/>
-                      <a:round/>
-                      <a:headEnd type="none" w="med" len="med"/>
-                      <a:tailEnd type="none" w="med" len="med"/>
-                    </a:lnT>
-                    <a:lnB w="12700" cap="flat" cmpd="sng" algn="ctr">
-                      <a:solidFill>
-                        <a:schemeClr val="tx1">
-                          <a:lumMod val="40000"/>
-                          <a:lumOff val="60000"/>
-                        </a:schemeClr>
-                      </a:solidFill>
-                      <a:prstDash val="sysDot"/>
-                      <a:round/>
-                      <a:headEnd type="none" w="med" len="med"/>
-                      <a:tailEnd type="none" w="med" len="med"/>
-                    </a:lnB>
-                    <a:lnTlToBr w="12700" cmpd="sng">
-                      <a:noFill/>
-                      <a:prstDash val="solid"/>
-                    </a:lnTlToBr>
-                    <a:lnBlToTr w="12700" cmpd="sng">
-                      <a:noFill/>
-                      <a:prstDash val="solid"/>
-                    </a:lnBlToTr>
-                    <a:solidFill>
-                      <a:schemeClr val="bg1"/>
-                    </a:solidFill>
-                  </a:tcPr>
-                </a:tc>
-                <a:tc>
-                  <a:txBody>
-                    <a:bodyPr/>
-                    <a:lstStyle/>
-                    <a:p>
-                      <a:pPr marL="0" algn="r" defTabSz="914400" rtl="0" eaLnBrk="1" fontAlgn="b" latinLnBrk="0" hangingPunct="1"/>
-                      <a:endParaRPr lang="en-US" sz="1200" b="0" i="0" u="none" strike="noStrike" kern="1200" dirty="0">
-                        <a:solidFill>
-                          <a:schemeClr val="tx1">
-                            <a:lumMod val="60000"/>
-                            <a:lumOff val="40000"/>
-                          </a:schemeClr>
-                        </a:solidFill>
-                        <a:effectLst/>
-                        <a:latin typeface="Calibri Regular"/>
-                        <a:ea typeface="+mn-ea"/>
-                        <a:cs typeface="+mn-cs"/>
                       </a:endParaRPr>
                     </a:p>
                   </a:txBody>
@@ -24132,11 +23282,11 @@
                 </a:tc>
                 <a:extLst>
                   <a:ext uri="{0D108BD9-81ED-4DB2-BD59-A6C34878D82A}">
-                    <a16:rowId xmlns:a16="http://schemas.microsoft.com/office/drawing/2014/main" val="933267410"/>
+                    <a16:rowId xmlns:a16="http://schemas.microsoft.com/office/drawing/2014/main" val="4060795780"/>
                   </a:ext>
                 </a:extLst>
               </a:tr>
-              <a:tr h="229541">
+              <a:tr h="279736">
                 <a:tc>
                   <a:txBody>
                     <a:bodyPr/>
@@ -24279,7 +23429,7 @@
                     <a:bodyPr/>
                     <a:lstStyle/>
                     <a:p>
-                      <a:pPr algn="r" fontAlgn="b"/>
+                      <a:pPr algn="l" fontAlgn="b"/>
                       <a:endParaRPr lang="en-US" sz="1200" b="0" i="0" u="none" strike="noStrike" dirty="0">
                         <a:solidFill>
                           <a:schemeClr val="tx1">
@@ -24289,71 +23439,6 @@
                         </a:solidFill>
                         <a:effectLst/>
                         <a:latin typeface="Calibri Regular"/>
-                      </a:endParaRPr>
-                    </a:p>
-                  </a:txBody>
-                  <a:tcPr marL="108000" marR="108000" marT="72000" marB="72000" anchor="ctr">
-                    <a:lnL>
-                      <a:noFill/>
-                    </a:lnL>
-                    <a:lnR w="9525" cap="flat" cmpd="sng" algn="ctr">
-                      <a:noFill/>
-                      <a:prstDash val="solid"/>
-                    </a:lnR>
-                    <a:lnT w="12700" cap="flat" cmpd="sng" algn="ctr">
-                      <a:solidFill>
-                        <a:schemeClr val="tx1">
-                          <a:lumMod val="40000"/>
-                          <a:lumOff val="60000"/>
-                        </a:schemeClr>
-                      </a:solidFill>
-                      <a:prstDash val="sysDot"/>
-                      <a:round/>
-                      <a:headEnd type="none" w="med" len="med"/>
-                      <a:tailEnd type="none" w="med" len="med"/>
-                    </a:lnT>
-                    <a:lnB w="12700" cap="flat" cmpd="sng" algn="ctr">
-                      <a:solidFill>
-                        <a:schemeClr val="tx1">
-                          <a:lumMod val="40000"/>
-                          <a:lumOff val="60000"/>
-                        </a:schemeClr>
-                      </a:solidFill>
-                      <a:prstDash val="sysDot"/>
-                      <a:round/>
-                      <a:headEnd type="none" w="med" len="med"/>
-                      <a:tailEnd type="none" w="med" len="med"/>
-                    </a:lnB>
-                    <a:lnTlToBr w="12700" cmpd="sng">
-                      <a:noFill/>
-                      <a:prstDash val="solid"/>
-                    </a:lnTlToBr>
-                    <a:lnBlToTr w="12700" cmpd="sng">
-                      <a:noFill/>
-                      <a:prstDash val="solid"/>
-                    </a:lnBlToTr>
-                    <a:solidFill>
-                      <a:schemeClr val="bg1"/>
-                    </a:solidFill>
-                  </a:tcPr>
-                </a:tc>
-                <a:tc>
-                  <a:txBody>
-                    <a:bodyPr/>
-                    <a:lstStyle/>
-                    <a:p>
-                      <a:pPr marL="0" algn="r" defTabSz="914400" rtl="0" eaLnBrk="1" fontAlgn="b" latinLnBrk="0" hangingPunct="1"/>
-                      <a:endParaRPr lang="en-US" sz="1200" b="0" i="0" u="none" strike="noStrike" kern="1200" dirty="0">
-                        <a:solidFill>
-                          <a:schemeClr val="tx1">
-                            <a:lumMod val="60000"/>
-                            <a:lumOff val="40000"/>
-                          </a:schemeClr>
-                        </a:solidFill>
-                        <a:effectLst/>
-                        <a:latin typeface="Calibri Regular"/>
-                        <a:ea typeface="+mn-ea"/>
-                        <a:cs typeface="+mn-cs"/>
                       </a:endParaRPr>
                     </a:p>
                   </a:txBody>
@@ -24469,11 +23554,11 @@
                 </a:tc>
                 <a:extLst>
                   <a:ext uri="{0D108BD9-81ED-4DB2-BD59-A6C34878D82A}">
-                    <a16:rowId xmlns:a16="http://schemas.microsoft.com/office/drawing/2014/main" val="2009910387"/>
+                    <a16:rowId xmlns:a16="http://schemas.microsoft.com/office/drawing/2014/main" val="933267410"/>
                   </a:ext>
                 </a:extLst>
               </a:tr>
-              <a:tr h="229541">
+              <a:tr h="279736">
                 <a:tc>
                   <a:txBody>
                     <a:bodyPr/>
@@ -24616,7 +23701,7 @@
                     <a:bodyPr/>
                     <a:lstStyle/>
                     <a:p>
-                      <a:pPr algn="r" fontAlgn="b"/>
+                      <a:pPr algn="l" fontAlgn="b"/>
                       <a:endParaRPr lang="en-US" sz="1200" b="0" i="0" u="none" strike="noStrike" dirty="0">
                         <a:solidFill>
                           <a:schemeClr val="tx1">
@@ -24626,71 +23711,6 @@
                         </a:solidFill>
                         <a:effectLst/>
                         <a:latin typeface="Calibri Regular"/>
-                      </a:endParaRPr>
-                    </a:p>
-                  </a:txBody>
-                  <a:tcPr marL="108000" marR="108000" marT="72000" marB="72000" anchor="ctr">
-                    <a:lnL>
-                      <a:noFill/>
-                    </a:lnL>
-                    <a:lnR w="9525" cap="flat" cmpd="sng" algn="ctr">
-                      <a:noFill/>
-                      <a:prstDash val="solid"/>
-                    </a:lnR>
-                    <a:lnT w="12700" cap="flat" cmpd="sng" algn="ctr">
-                      <a:solidFill>
-                        <a:schemeClr val="tx1">
-                          <a:lumMod val="40000"/>
-                          <a:lumOff val="60000"/>
-                        </a:schemeClr>
-                      </a:solidFill>
-                      <a:prstDash val="sysDot"/>
-                      <a:round/>
-                      <a:headEnd type="none" w="med" len="med"/>
-                      <a:tailEnd type="none" w="med" len="med"/>
-                    </a:lnT>
-                    <a:lnB w="12700" cap="flat" cmpd="sng" algn="ctr">
-                      <a:solidFill>
-                        <a:schemeClr val="tx1">
-                          <a:lumMod val="40000"/>
-                          <a:lumOff val="60000"/>
-                        </a:schemeClr>
-                      </a:solidFill>
-                      <a:prstDash val="sysDot"/>
-                      <a:round/>
-                      <a:headEnd type="none" w="med" len="med"/>
-                      <a:tailEnd type="none" w="med" len="med"/>
-                    </a:lnB>
-                    <a:lnTlToBr w="12700" cmpd="sng">
-                      <a:noFill/>
-                      <a:prstDash val="solid"/>
-                    </a:lnTlToBr>
-                    <a:lnBlToTr w="12700" cmpd="sng">
-                      <a:noFill/>
-                      <a:prstDash val="solid"/>
-                    </a:lnBlToTr>
-                    <a:solidFill>
-                      <a:schemeClr val="bg1"/>
-                    </a:solidFill>
-                  </a:tcPr>
-                </a:tc>
-                <a:tc>
-                  <a:txBody>
-                    <a:bodyPr/>
-                    <a:lstStyle/>
-                    <a:p>
-                      <a:pPr marL="0" algn="r" defTabSz="914400" rtl="0" eaLnBrk="1" fontAlgn="b" latinLnBrk="0" hangingPunct="1"/>
-                      <a:endParaRPr lang="en-US" sz="1200" b="0" i="0" u="none" strike="noStrike" kern="1200" dirty="0">
-                        <a:solidFill>
-                          <a:schemeClr val="tx1">
-                            <a:lumMod val="60000"/>
-                            <a:lumOff val="40000"/>
-                          </a:schemeClr>
-                        </a:solidFill>
-                        <a:effectLst/>
-                        <a:latin typeface="Calibri Regular"/>
-                        <a:ea typeface="+mn-ea"/>
-                        <a:cs typeface="+mn-cs"/>
                       </a:endParaRPr>
                     </a:p>
                   </a:txBody>
@@ -24806,11 +23826,11 @@
                 </a:tc>
                 <a:extLst>
                   <a:ext uri="{0D108BD9-81ED-4DB2-BD59-A6C34878D82A}">
-                    <a16:rowId xmlns:a16="http://schemas.microsoft.com/office/drawing/2014/main" val="1372763307"/>
+                    <a16:rowId xmlns:a16="http://schemas.microsoft.com/office/drawing/2014/main" val="2009910387"/>
                   </a:ext>
                 </a:extLst>
               </a:tr>
-              <a:tr h="229541">
+              <a:tr h="279736">
                 <a:tc>
                   <a:txBody>
                     <a:bodyPr/>
@@ -24953,7 +23973,7 @@
                     <a:bodyPr/>
                     <a:lstStyle/>
                     <a:p>
-                      <a:pPr algn="r" fontAlgn="b"/>
+                      <a:pPr algn="l" fontAlgn="b"/>
                       <a:endParaRPr lang="en-US" sz="1200" b="0" i="0" u="none" strike="noStrike" dirty="0">
                         <a:solidFill>
                           <a:schemeClr val="tx1">
@@ -24963,71 +23983,6 @@
                         </a:solidFill>
                         <a:effectLst/>
                         <a:latin typeface="Calibri Regular"/>
-                      </a:endParaRPr>
-                    </a:p>
-                  </a:txBody>
-                  <a:tcPr marL="108000" marR="108000" marT="72000" marB="72000" anchor="ctr">
-                    <a:lnL>
-                      <a:noFill/>
-                    </a:lnL>
-                    <a:lnR w="9525" cap="flat" cmpd="sng" algn="ctr">
-                      <a:noFill/>
-                      <a:prstDash val="solid"/>
-                    </a:lnR>
-                    <a:lnT w="12700" cap="flat" cmpd="sng" algn="ctr">
-                      <a:solidFill>
-                        <a:schemeClr val="tx1">
-                          <a:lumMod val="40000"/>
-                          <a:lumOff val="60000"/>
-                        </a:schemeClr>
-                      </a:solidFill>
-                      <a:prstDash val="sysDot"/>
-                      <a:round/>
-                      <a:headEnd type="none" w="med" len="med"/>
-                      <a:tailEnd type="none" w="med" len="med"/>
-                    </a:lnT>
-                    <a:lnB w="12700" cap="flat" cmpd="sng" algn="ctr">
-                      <a:solidFill>
-                        <a:schemeClr val="tx1">
-                          <a:lumMod val="40000"/>
-                          <a:lumOff val="60000"/>
-                        </a:schemeClr>
-                      </a:solidFill>
-                      <a:prstDash val="sysDot"/>
-                      <a:round/>
-                      <a:headEnd type="none" w="med" len="med"/>
-                      <a:tailEnd type="none" w="med" len="med"/>
-                    </a:lnB>
-                    <a:lnTlToBr w="12700" cmpd="sng">
-                      <a:noFill/>
-                      <a:prstDash val="solid"/>
-                    </a:lnTlToBr>
-                    <a:lnBlToTr w="12700" cmpd="sng">
-                      <a:noFill/>
-                      <a:prstDash val="solid"/>
-                    </a:lnBlToTr>
-                    <a:solidFill>
-                      <a:schemeClr val="bg1"/>
-                    </a:solidFill>
-                  </a:tcPr>
-                </a:tc>
-                <a:tc>
-                  <a:txBody>
-                    <a:bodyPr/>
-                    <a:lstStyle/>
-                    <a:p>
-                      <a:pPr marL="0" algn="r" defTabSz="914400" rtl="0" eaLnBrk="1" fontAlgn="b" latinLnBrk="0" hangingPunct="1"/>
-                      <a:endParaRPr lang="en-US" sz="1200" b="0" i="0" u="none" strike="noStrike" kern="1200" dirty="0">
-                        <a:solidFill>
-                          <a:schemeClr val="tx1">
-                            <a:lumMod val="60000"/>
-                            <a:lumOff val="40000"/>
-                          </a:schemeClr>
-                        </a:solidFill>
-                        <a:effectLst/>
-                        <a:latin typeface="Calibri Regular"/>
-                        <a:ea typeface="+mn-ea"/>
-                        <a:cs typeface="+mn-cs"/>
                       </a:endParaRPr>
                     </a:p>
                   </a:txBody>
@@ -25143,11 +24098,11 @@
                 </a:tc>
                 <a:extLst>
                   <a:ext uri="{0D108BD9-81ED-4DB2-BD59-A6C34878D82A}">
-                    <a16:rowId xmlns:a16="http://schemas.microsoft.com/office/drawing/2014/main" val="4022263985"/>
+                    <a16:rowId xmlns:a16="http://schemas.microsoft.com/office/drawing/2014/main" val="1372763307"/>
                   </a:ext>
                 </a:extLst>
               </a:tr>
-              <a:tr h="229541">
+              <a:tr h="279736">
                 <a:tc>
                   <a:txBody>
                     <a:bodyPr/>
@@ -25290,7 +24245,7 @@
                     <a:bodyPr/>
                     <a:lstStyle/>
                     <a:p>
-                      <a:pPr algn="r" fontAlgn="b"/>
+                      <a:pPr algn="l" fontAlgn="b"/>
                       <a:endParaRPr lang="en-US" sz="1200" b="0" i="0" u="none" strike="noStrike" dirty="0">
                         <a:solidFill>
                           <a:schemeClr val="tx1">
@@ -25300,71 +24255,6 @@
                         </a:solidFill>
                         <a:effectLst/>
                         <a:latin typeface="Calibri Regular"/>
-                      </a:endParaRPr>
-                    </a:p>
-                  </a:txBody>
-                  <a:tcPr marL="108000" marR="108000" marT="72000" marB="72000" anchor="ctr">
-                    <a:lnL>
-                      <a:noFill/>
-                    </a:lnL>
-                    <a:lnR w="9525" cap="flat" cmpd="sng" algn="ctr">
-                      <a:noFill/>
-                      <a:prstDash val="solid"/>
-                    </a:lnR>
-                    <a:lnT w="12700" cap="flat" cmpd="sng" algn="ctr">
-                      <a:solidFill>
-                        <a:schemeClr val="tx1">
-                          <a:lumMod val="40000"/>
-                          <a:lumOff val="60000"/>
-                        </a:schemeClr>
-                      </a:solidFill>
-                      <a:prstDash val="sysDot"/>
-                      <a:round/>
-                      <a:headEnd type="none" w="med" len="med"/>
-                      <a:tailEnd type="none" w="med" len="med"/>
-                    </a:lnT>
-                    <a:lnB w="12700" cap="flat" cmpd="sng" algn="ctr">
-                      <a:solidFill>
-                        <a:schemeClr val="tx1">
-                          <a:lumMod val="40000"/>
-                          <a:lumOff val="60000"/>
-                        </a:schemeClr>
-                      </a:solidFill>
-                      <a:prstDash val="sysDot"/>
-                      <a:round/>
-                      <a:headEnd type="none" w="med" len="med"/>
-                      <a:tailEnd type="none" w="med" len="med"/>
-                    </a:lnB>
-                    <a:lnTlToBr w="12700" cmpd="sng">
-                      <a:noFill/>
-                      <a:prstDash val="solid"/>
-                    </a:lnTlToBr>
-                    <a:lnBlToTr w="12700" cmpd="sng">
-                      <a:noFill/>
-                      <a:prstDash val="solid"/>
-                    </a:lnBlToTr>
-                    <a:solidFill>
-                      <a:schemeClr val="bg1"/>
-                    </a:solidFill>
-                  </a:tcPr>
-                </a:tc>
-                <a:tc>
-                  <a:txBody>
-                    <a:bodyPr/>
-                    <a:lstStyle/>
-                    <a:p>
-                      <a:pPr marL="0" algn="r" defTabSz="914400" rtl="0" eaLnBrk="1" fontAlgn="b" latinLnBrk="0" hangingPunct="1"/>
-                      <a:endParaRPr lang="en-US" sz="1200" b="0" i="0" u="none" strike="noStrike" kern="1200" dirty="0">
-                        <a:solidFill>
-                          <a:schemeClr val="tx1">
-                            <a:lumMod val="60000"/>
-                            <a:lumOff val="40000"/>
-                          </a:schemeClr>
-                        </a:solidFill>
-                        <a:effectLst/>
-                        <a:latin typeface="Calibri Regular"/>
-                        <a:ea typeface="+mn-ea"/>
-                        <a:cs typeface="+mn-cs"/>
                       </a:endParaRPr>
                     </a:p>
                   </a:txBody>
@@ -25480,33 +24370,17 @@
                 </a:tc>
                 <a:extLst>
                   <a:ext uri="{0D108BD9-81ED-4DB2-BD59-A6C34878D82A}">
-                    <a16:rowId xmlns:a16="http://schemas.microsoft.com/office/drawing/2014/main" val="516404128"/>
+                    <a16:rowId xmlns:a16="http://schemas.microsoft.com/office/drawing/2014/main" val="4022263985"/>
                   </a:ext>
                 </a:extLst>
               </a:tr>
-              <a:tr h="229541">
+              <a:tr h="279736">
                 <a:tc>
                   <a:txBody>
                     <a:bodyPr/>
                     <a:lstStyle/>
                     <a:p>
-                      <a:pPr marL="0" marR="0" lvl="0" indent="0" algn="l" defTabSz="914400" rtl="0" eaLnBrk="1" fontAlgn="b" latinLnBrk="0" hangingPunct="1">
-                        <a:lnSpc>
-                          <a:spcPct val="100000"/>
-                        </a:lnSpc>
-                        <a:spcBef>
-                          <a:spcPts val="0"/>
-                        </a:spcBef>
-                        <a:spcAft>
-                          <a:spcPts val="0"/>
-                        </a:spcAft>
-                        <a:buClrTx/>
-                        <a:buSzTx/>
-                        <a:buFontTx/>
-                        <a:buNone/>
-                        <a:tabLst/>
-                        <a:defRPr/>
-                      </a:pPr>
+                      <a:pPr algn="l" fontAlgn="b"/>
                       <a:endParaRPr lang="en-US" sz="1200" b="0" i="0" u="none" strike="noStrike" dirty="0">
                         <a:solidFill>
                           <a:schemeClr val="tx2"/>
@@ -25643,7 +24517,7 @@
                     <a:bodyPr/>
                     <a:lstStyle/>
                     <a:p>
-                      <a:pPr algn="r" fontAlgn="b"/>
+                      <a:pPr algn="l" fontAlgn="b"/>
                       <a:endParaRPr lang="en-US" sz="1200" b="0" i="0" u="none" strike="noStrike" dirty="0">
                         <a:solidFill>
                           <a:schemeClr val="tx1">
@@ -25653,71 +24527,6 @@
                         </a:solidFill>
                         <a:effectLst/>
                         <a:latin typeface="Calibri Regular"/>
-                      </a:endParaRPr>
-                    </a:p>
-                  </a:txBody>
-                  <a:tcPr marL="108000" marR="108000" marT="72000" marB="72000" anchor="ctr">
-                    <a:lnL>
-                      <a:noFill/>
-                    </a:lnL>
-                    <a:lnR w="9525" cap="flat" cmpd="sng" algn="ctr">
-                      <a:noFill/>
-                      <a:prstDash val="solid"/>
-                    </a:lnR>
-                    <a:lnT w="12700" cap="flat" cmpd="sng" algn="ctr">
-                      <a:solidFill>
-                        <a:schemeClr val="tx1">
-                          <a:lumMod val="40000"/>
-                          <a:lumOff val="60000"/>
-                        </a:schemeClr>
-                      </a:solidFill>
-                      <a:prstDash val="sysDot"/>
-                      <a:round/>
-                      <a:headEnd type="none" w="med" len="med"/>
-                      <a:tailEnd type="none" w="med" len="med"/>
-                    </a:lnT>
-                    <a:lnB w="12700" cap="flat" cmpd="sng" algn="ctr">
-                      <a:solidFill>
-                        <a:schemeClr val="tx1">
-                          <a:lumMod val="40000"/>
-                          <a:lumOff val="60000"/>
-                        </a:schemeClr>
-                      </a:solidFill>
-                      <a:prstDash val="sysDot"/>
-                      <a:round/>
-                      <a:headEnd type="none" w="med" len="med"/>
-                      <a:tailEnd type="none" w="med" len="med"/>
-                    </a:lnB>
-                    <a:lnTlToBr w="12700" cmpd="sng">
-                      <a:noFill/>
-                      <a:prstDash val="solid"/>
-                    </a:lnTlToBr>
-                    <a:lnBlToTr w="12700" cmpd="sng">
-                      <a:noFill/>
-                      <a:prstDash val="solid"/>
-                    </a:lnBlToTr>
-                    <a:solidFill>
-                      <a:schemeClr val="bg1"/>
-                    </a:solidFill>
-                  </a:tcPr>
-                </a:tc>
-                <a:tc>
-                  <a:txBody>
-                    <a:bodyPr/>
-                    <a:lstStyle/>
-                    <a:p>
-                      <a:pPr marL="0" algn="r" defTabSz="914400" rtl="0" eaLnBrk="1" fontAlgn="b" latinLnBrk="0" hangingPunct="1"/>
-                      <a:endParaRPr lang="en-US" sz="1200" b="0" i="0" u="none" strike="noStrike" kern="1200" dirty="0">
-                        <a:solidFill>
-                          <a:schemeClr val="tx1">
-                            <a:lumMod val="60000"/>
-                            <a:lumOff val="40000"/>
-                          </a:schemeClr>
-                        </a:solidFill>
-                        <a:effectLst/>
-                        <a:latin typeface="Calibri Regular"/>
-                        <a:ea typeface="+mn-ea"/>
-                        <a:cs typeface="+mn-cs"/>
                       </a:endParaRPr>
                     </a:p>
                   </a:txBody>
@@ -25833,11 +24642,11 @@
                 </a:tc>
                 <a:extLst>
                   <a:ext uri="{0D108BD9-81ED-4DB2-BD59-A6C34878D82A}">
-                    <a16:rowId xmlns:a16="http://schemas.microsoft.com/office/drawing/2014/main" val="3255606331"/>
+                    <a16:rowId xmlns:a16="http://schemas.microsoft.com/office/drawing/2014/main" val="516404128"/>
                   </a:ext>
                 </a:extLst>
               </a:tr>
-              <a:tr h="229541">
+              <a:tr h="279736">
                 <a:tc>
                   <a:txBody>
                     <a:bodyPr/>
@@ -25890,8 +24699,13 @@
                       <a:tailEnd type="none" w="med" len="med"/>
                     </a:lnT>
                     <a:lnB w="12700" cap="flat" cmpd="sng" algn="ctr">
-                      <a:noFill/>
-                      <a:prstDash val="solid"/>
+                      <a:solidFill>
+                        <a:schemeClr val="tx1">
+                          <a:lumMod val="40000"/>
+                          <a:lumOff val="60000"/>
+                        </a:schemeClr>
+                      </a:solidFill>
+                      <a:prstDash val="sysDot"/>
                       <a:round/>
                       <a:headEnd type="none" w="med" len="med"/>
                       <a:tailEnd type="none" w="med" len="med"/>
@@ -25962,8 +24776,13 @@
                       <a:tailEnd type="none" w="med" len="med"/>
                     </a:lnT>
                     <a:lnB w="12700" cap="flat" cmpd="sng" algn="ctr">
-                      <a:noFill/>
-                      <a:prstDash val="solid"/>
+                      <a:solidFill>
+                        <a:schemeClr val="tx1">
+                          <a:lumMod val="40000"/>
+                          <a:lumOff val="60000"/>
+                        </a:schemeClr>
+                      </a:solidFill>
+                      <a:prstDash val="sysDot"/>
                       <a:round/>
                       <a:headEnd type="none" w="med" len="med"/>
                       <a:tailEnd type="none" w="med" len="med"/>
@@ -25986,7 +24805,7 @@
                     <a:bodyPr/>
                     <a:lstStyle/>
                     <a:p>
-                      <a:pPr algn="r" fontAlgn="b"/>
+                      <a:pPr algn="l" fontAlgn="b"/>
                       <a:endParaRPr lang="en-US" sz="1200" b="0" i="0" u="none" strike="noStrike" dirty="0">
                         <a:solidFill>
                           <a:schemeClr val="tx1">
@@ -26020,8 +24839,13 @@
                       <a:tailEnd type="none" w="med" len="med"/>
                     </a:lnT>
                     <a:lnB w="12700" cap="flat" cmpd="sng" algn="ctr">
-                      <a:noFill/>
-                      <a:prstDash val="solid"/>
+                      <a:solidFill>
+                        <a:schemeClr val="tx1">
+                          <a:lumMod val="40000"/>
+                          <a:lumOff val="60000"/>
+                        </a:schemeClr>
+                      </a:solidFill>
+                      <a:prstDash val="sysDot"/>
                       <a:round/>
                       <a:headEnd type="none" w="med" len="med"/>
                       <a:tailEnd type="none" w="med" len="med"/>
@@ -26044,7 +24868,7 @@
                     <a:bodyPr/>
                     <a:lstStyle/>
                     <a:p>
-                      <a:pPr marL="0" algn="r" defTabSz="914400" rtl="0" eaLnBrk="1" fontAlgn="b" latinLnBrk="0" hangingPunct="1"/>
+                      <a:pPr marL="0" algn="l" defTabSz="914400" rtl="0" eaLnBrk="1" fontAlgn="b" latinLnBrk="0" hangingPunct="1"/>
                       <a:endParaRPr lang="en-US" sz="1200" b="0" i="0" u="none" strike="noStrike" kern="1200" dirty="0">
                         <a:solidFill>
                           <a:schemeClr val="tx1">
@@ -26056,6 +24880,219 @@
                         <a:latin typeface="Calibri Regular"/>
                         <a:ea typeface="+mn-ea"/>
                         <a:cs typeface="+mn-cs"/>
+                      </a:endParaRPr>
+                    </a:p>
+                  </a:txBody>
+                  <a:tcPr marL="108000" marR="108000" marT="72000" marB="72000" anchor="ctr">
+                    <a:lnL>
+                      <a:noFill/>
+                    </a:lnL>
+                    <a:lnR w="9525" cap="flat" cmpd="sng" algn="ctr">
+                      <a:noFill/>
+                      <a:prstDash val="solid"/>
+                    </a:lnR>
+                    <a:lnT w="12700" cap="flat" cmpd="sng" algn="ctr">
+                      <a:solidFill>
+                        <a:schemeClr val="tx1">
+                          <a:lumMod val="40000"/>
+                          <a:lumOff val="60000"/>
+                        </a:schemeClr>
+                      </a:solidFill>
+                      <a:prstDash val="sysDot"/>
+                      <a:round/>
+                      <a:headEnd type="none" w="med" len="med"/>
+                      <a:tailEnd type="none" w="med" len="med"/>
+                    </a:lnT>
+                    <a:lnB w="12700" cap="flat" cmpd="sng" algn="ctr">
+                      <a:solidFill>
+                        <a:schemeClr val="tx1">
+                          <a:lumMod val="40000"/>
+                          <a:lumOff val="60000"/>
+                        </a:schemeClr>
+                      </a:solidFill>
+                      <a:prstDash val="sysDot"/>
+                      <a:round/>
+                      <a:headEnd type="none" w="med" len="med"/>
+                      <a:tailEnd type="none" w="med" len="med"/>
+                    </a:lnB>
+                    <a:lnTlToBr w="12700" cmpd="sng">
+                      <a:noFill/>
+                      <a:prstDash val="solid"/>
+                    </a:lnTlToBr>
+                    <a:lnBlToTr w="12700" cmpd="sng">
+                      <a:noFill/>
+                      <a:prstDash val="solid"/>
+                    </a:lnBlToTr>
+                    <a:solidFill>
+                      <a:schemeClr val="bg1"/>
+                    </a:solidFill>
+                  </a:tcPr>
+                </a:tc>
+                <a:extLst>
+                  <a:ext uri="{0D108BD9-81ED-4DB2-BD59-A6C34878D82A}">
+                    <a16:rowId xmlns:a16="http://schemas.microsoft.com/office/drawing/2014/main" val="3255606331"/>
+                  </a:ext>
+                </a:extLst>
+              </a:tr>
+              <a:tr h="279736">
+                <a:tc>
+                  <a:txBody>
+                    <a:bodyPr/>
+                    <a:lstStyle/>
+                    <a:p>
+                      <a:pPr marL="0" marR="0" lvl="0" indent="0" algn="l" defTabSz="914400" rtl="0" eaLnBrk="1" fontAlgn="b" latinLnBrk="0" hangingPunct="1">
+                        <a:lnSpc>
+                          <a:spcPct val="100000"/>
+                        </a:lnSpc>
+                        <a:spcBef>
+                          <a:spcPts val="0"/>
+                        </a:spcBef>
+                        <a:spcAft>
+                          <a:spcPts val="0"/>
+                        </a:spcAft>
+                        <a:buClrTx/>
+                        <a:buSzTx/>
+                        <a:buFontTx/>
+                        <a:buNone/>
+                        <a:tabLst/>
+                        <a:defRPr/>
+                      </a:pPr>
+                      <a:endParaRPr lang="en-US" sz="1200" b="0" i="0" u="none" strike="noStrike" dirty="0">
+                        <a:solidFill>
+                          <a:schemeClr val="tx2"/>
+                        </a:solidFill>
+                        <a:effectLst/>
+                        <a:latin typeface="Calibri Regular"/>
+                      </a:endParaRPr>
+                    </a:p>
+                  </a:txBody>
+                  <a:tcPr marL="108000" marR="108000" marT="72000" marB="72000" anchor="ctr">
+                    <a:lnL w="9525" cap="flat" cmpd="sng" algn="ctr">
+                      <a:noFill/>
+                      <a:prstDash val="solid"/>
+                    </a:lnL>
+                    <a:lnR>
+                      <a:noFill/>
+                    </a:lnR>
+                    <a:lnT w="12700" cap="flat" cmpd="sng" algn="ctr">
+                      <a:solidFill>
+                        <a:schemeClr val="tx1">
+                          <a:lumMod val="40000"/>
+                          <a:lumOff val="60000"/>
+                        </a:schemeClr>
+                      </a:solidFill>
+                      <a:prstDash val="sysDot"/>
+                      <a:round/>
+                      <a:headEnd type="none" w="med" len="med"/>
+                      <a:tailEnd type="none" w="med" len="med"/>
+                    </a:lnT>
+                    <a:lnB w="12700" cap="flat" cmpd="sng" algn="ctr">
+                      <a:noFill/>
+                      <a:prstDash val="solid"/>
+                      <a:round/>
+                      <a:headEnd type="none" w="med" len="med"/>
+                      <a:tailEnd type="none" w="med" len="med"/>
+                    </a:lnB>
+                    <a:lnTlToBr w="12700" cmpd="sng">
+                      <a:noFill/>
+                      <a:prstDash val="solid"/>
+                    </a:lnTlToBr>
+                    <a:lnBlToTr w="12700" cmpd="sng">
+                      <a:noFill/>
+                      <a:prstDash val="solid"/>
+                    </a:lnBlToTr>
+                    <a:solidFill>
+                      <a:schemeClr val="bg1"/>
+                    </a:solidFill>
+                  </a:tcPr>
+                </a:tc>
+                <a:tc>
+                  <a:txBody>
+                    <a:bodyPr/>
+                    <a:lstStyle/>
+                    <a:p>
+                      <a:pPr marL="0" marR="0" lvl="0" indent="0" algn="r" defTabSz="914400" rtl="0" eaLnBrk="1" fontAlgn="b" latinLnBrk="0" hangingPunct="1">
+                        <a:lnSpc>
+                          <a:spcPct val="100000"/>
+                        </a:lnSpc>
+                        <a:spcBef>
+                          <a:spcPts val="0"/>
+                        </a:spcBef>
+                        <a:spcAft>
+                          <a:spcPts val="0"/>
+                        </a:spcAft>
+                        <a:buClrTx/>
+                        <a:buSzTx/>
+                        <a:buFontTx/>
+                        <a:buNone/>
+                        <a:tabLst/>
+                        <a:defRPr/>
+                      </a:pPr>
+                      <a:endParaRPr lang="en-US" sz="1200" b="0" i="0" u="none" strike="noStrike" kern="1200" dirty="0">
+                        <a:solidFill>
+                          <a:schemeClr val="tx2"/>
+                        </a:solidFill>
+                        <a:effectLst/>
+                        <a:latin typeface="Calibri Bold"/>
+                        <a:ea typeface="+mn-ea"/>
+                        <a:cs typeface="+mn-cs"/>
+                      </a:endParaRPr>
+                    </a:p>
+                  </a:txBody>
+                  <a:tcPr marL="108000" marR="108000" marT="72000" marB="72000" anchor="ctr">
+                    <a:lnL>
+                      <a:noFill/>
+                    </a:lnL>
+                    <a:lnR>
+                      <a:noFill/>
+                    </a:lnR>
+                    <a:lnT w="12700" cap="flat" cmpd="sng" algn="ctr">
+                      <a:solidFill>
+                        <a:schemeClr val="tx1">
+                          <a:lumMod val="40000"/>
+                          <a:lumOff val="60000"/>
+                        </a:schemeClr>
+                      </a:solidFill>
+                      <a:prstDash val="sysDot"/>
+                      <a:round/>
+                      <a:headEnd type="none" w="med" len="med"/>
+                      <a:tailEnd type="none" w="med" len="med"/>
+                    </a:lnT>
+                    <a:lnB w="12700" cap="flat" cmpd="sng" algn="ctr">
+                      <a:noFill/>
+                      <a:prstDash val="solid"/>
+                      <a:round/>
+                      <a:headEnd type="none" w="med" len="med"/>
+                      <a:tailEnd type="none" w="med" len="med"/>
+                    </a:lnB>
+                    <a:lnTlToBr w="12700" cmpd="sng">
+                      <a:noFill/>
+                      <a:prstDash val="solid"/>
+                    </a:lnTlToBr>
+                    <a:lnBlToTr w="12700" cmpd="sng">
+                      <a:noFill/>
+                      <a:prstDash val="solid"/>
+                    </a:lnBlToTr>
+                    <a:solidFill>
+                      <a:srgbClr val="FEF5BA"/>
+                    </a:solidFill>
+                  </a:tcPr>
+                </a:tc>
+                <a:tc>
+                  <a:txBody>
+                    <a:bodyPr/>
+                    <a:lstStyle/>
+                    <a:p>
+                      <a:pPr algn="l" fontAlgn="b"/>
+                      <a:endParaRPr lang="en-US" sz="1200" b="0" i="0" u="none" strike="noStrike" dirty="0">
+                        <a:solidFill>
+                          <a:schemeClr val="tx1">
+                            <a:lumMod val="60000"/>
+                            <a:lumOff val="40000"/>
+                          </a:schemeClr>
+                        </a:solidFill>
+                        <a:effectLst/>
+                        <a:latin typeface="Calibri Regular"/>
                       </a:endParaRPr>
                     </a:p>
                   </a:txBody>
@@ -27083,6 +26120,15 @@
 </file>
 
 <file path=customXml/item1.xml><?xml version="1.0" encoding="utf-8"?>
+<?mso-contentType ?>
+<FormTemplates xmlns="http://schemas.microsoft.com/sharepoint/v3/contenttype/forms">
+  <Display>DocumentLibraryForm</Display>
+  <Edit>DocumentLibraryForm</Edit>
+  <New>DocumentLibraryForm</New>
+</FormTemplates>
+</file>
+
+<file path=customXml/item2.xml><?xml version="1.0" encoding="utf-8"?>
 <ct:contentTypeSchema xmlns:ct="http://schemas.microsoft.com/office/2006/metadata/contentType" xmlns:ma="http://schemas.microsoft.com/office/2006/metadata/properties/metaAttributes" ct:_="" ma:_="" ma:contentTypeName="Document" ma:contentTypeID="0x010100398B4EB28540854BB4092730D7F67224" ma:contentTypeVersion="13" ma:contentTypeDescription="Create a new document." ma:contentTypeScope="" ma:versionID="07d6997c7358ecc3b6f0d78039f1ac55">
   <xsd:schema xmlns:xsd="http://www.w3.org/2001/XMLSchema" xmlns:xs="http://www.w3.org/2001/XMLSchema" xmlns:p="http://schemas.microsoft.com/office/2006/metadata/properties" xmlns:ns2="fa937df2-abe2-4d38-b5f4-c228acba3827" xmlns:ns3="bc8ba18a-4a58-4ad2-bfc0-6516af8e7dc2" targetNamespace="http://schemas.microsoft.com/office/2006/metadata/properties" ma:root="true" ma:fieldsID="a7d20d2c9a349b6838acf4b79389f2fd" ns2:_="" ns3:_="">
     <xsd:import namespace="fa937df2-abe2-4d38-b5f4-c228acba3827"/>
@@ -27305,7 +26351,7 @@
 </ct:contentTypeSchema>
 </file>
 
-<file path=customXml/item2.xml><?xml version="1.0" encoding="utf-8"?>
+<file path=customXml/item3.xml><?xml version="1.0" encoding="utf-8"?>
 <p:properties xmlns:p="http://schemas.microsoft.com/office/2006/metadata/properties" xmlns:xsi="http://www.w3.org/2001/XMLSchema-instance" xmlns:pc="http://schemas.microsoft.com/office/infopath/2007/PartnerControls">
   <documentManagement>
     <lcf76f155ced4ddcb4097134ff3c332f xmlns="fa937df2-abe2-4d38-b5f4-c228acba3827">
@@ -27316,16 +26362,15 @@
 </p:properties>
 </file>
 
-<file path=customXml/item3.xml><?xml version="1.0" encoding="utf-8"?>
-<?mso-contentType ?>
-<FormTemplates xmlns="http://schemas.microsoft.com/sharepoint/v3/contenttype/forms">
-  <Display>DocumentLibraryForm</Display>
-  <Edit>DocumentLibraryForm</Edit>
-  <New>DocumentLibraryForm</New>
-</FormTemplates>
+<file path=customXml/itemProps1.xml><?xml version="1.0" encoding="utf-8"?>
+<ds:datastoreItem xmlns:ds="http://schemas.openxmlformats.org/officeDocument/2006/customXml" ds:itemID="{570928F0-D7CA-4732-B7F3-1F945720D0AA}">
+  <ds:schemaRefs>
+    <ds:schemaRef ds:uri="http://schemas.microsoft.com/sharepoint/v3/contenttype/forms"/>
+  </ds:schemaRefs>
+</ds:datastoreItem>
 </file>
 
-<file path=customXml/itemProps1.xml><?xml version="1.0" encoding="utf-8"?>
+<file path=customXml/itemProps2.xml><?xml version="1.0" encoding="utf-8"?>
 <ds:datastoreItem xmlns:ds="http://schemas.openxmlformats.org/officeDocument/2006/customXml" ds:itemID="{06E6923A-C221-4753-B75B-BA213EEB7564}">
   <ds:schemaRefs>
     <ds:schemaRef ds:uri="bc8ba18a-4a58-4ad2-bfc0-6516af8e7dc2"/>
@@ -27344,7 +26389,7 @@
 </ds:datastoreItem>
 </file>
 
-<file path=customXml/itemProps2.xml><?xml version="1.0" encoding="utf-8"?>
+<file path=customXml/itemProps3.xml><?xml version="1.0" encoding="utf-8"?>
 <ds:datastoreItem xmlns:ds="http://schemas.openxmlformats.org/officeDocument/2006/customXml" ds:itemID="{4B629362-CF15-4610-8FAC-A8E699942233}">
   <ds:schemaRefs>
     <ds:schemaRef ds:uri="http://schemas.microsoft.com/office/2006/documentManagement/types"/>
@@ -27359,12 +26404,4 @@
     <ds:schemaRef ds:uri="http://purl.org/dc/dcmitype/"/>
   </ds:schemaRefs>
 </ds:datastoreItem>
-</file>
-
-<file path=customXml/itemProps3.xml><?xml version="1.0" encoding="utf-8"?>
-<ds:datastoreItem xmlns:ds="http://schemas.openxmlformats.org/officeDocument/2006/customXml" ds:itemID="{570928F0-D7CA-4732-B7F3-1F945720D0AA}">
-  <ds:schemaRefs>
-    <ds:schemaRef ds:uri="http://schemas.microsoft.com/sharepoint/v3/contenttype/forms"/>
-  </ds:schemaRefs>
-</ds:datastoreItem>
 </file>
</xml_diff>